<commit_message>
update bao cao lân 2
</commit_message>
<xml_diff>
--- a/bccnpm2_1.pptx
+++ b/bccnpm2_1.pptx
@@ -7,24 +7,25 @@
     <p:sldMasterId id="2147483671" r:id="rId3"/>
   </p:sldMasterIdLst>
   <p:notesMasterIdLst>
-    <p:notesMasterId r:id="rId19"/>
+    <p:notesMasterId r:id="rId20"/>
   </p:notesMasterIdLst>
   <p:sldIdLst>
     <p:sldId id="266" r:id="rId4"/>
     <p:sldId id="270" r:id="rId5"/>
-    <p:sldId id="273" r:id="rId6"/>
-    <p:sldId id="272" r:id="rId7"/>
-    <p:sldId id="274" r:id="rId8"/>
-    <p:sldId id="267" r:id="rId9"/>
-    <p:sldId id="268" r:id="rId10"/>
-    <p:sldId id="263" r:id="rId11"/>
-    <p:sldId id="275" r:id="rId12"/>
-    <p:sldId id="276" r:id="rId13"/>
-    <p:sldId id="277" r:id="rId14"/>
-    <p:sldId id="279" r:id="rId15"/>
-    <p:sldId id="278" r:id="rId16"/>
-    <p:sldId id="264" r:id="rId17"/>
-    <p:sldId id="269" r:id="rId18"/>
+    <p:sldId id="280" r:id="rId6"/>
+    <p:sldId id="273" r:id="rId7"/>
+    <p:sldId id="272" r:id="rId8"/>
+    <p:sldId id="274" r:id="rId9"/>
+    <p:sldId id="267" r:id="rId10"/>
+    <p:sldId id="268" r:id="rId11"/>
+    <p:sldId id="263" r:id="rId12"/>
+    <p:sldId id="275" r:id="rId13"/>
+    <p:sldId id="276" r:id="rId14"/>
+    <p:sldId id="277" r:id="rId15"/>
+    <p:sldId id="279" r:id="rId16"/>
+    <p:sldId id="278" r:id="rId17"/>
+    <p:sldId id="264" r:id="rId18"/>
+    <p:sldId id="269" r:id="rId19"/>
   </p:sldIdLst>
   <p:sldSz cx="9144000" cy="5143500" type="screen16x9"/>
   <p:notesSz cx="6858000" cy="9144000"/>
@@ -30752,1580 +30753,237 @@
       </p:grpSpPr>
       <p:sp>
         <p:nvSpPr>
-          <p:cNvPr id="4" name="Rounded Rectangle 3"/>
+          <p:cNvPr id="7" name="Rectangle 6"/>
           <p:cNvSpPr/>
           <p:nvPr/>
         </p:nvSpPr>
         <p:spPr>
           <a:xfrm>
-            <a:off x="457200" y="361950"/>
-            <a:ext cx="8229600" cy="4572000"/>
-          </a:xfrm>
-          <a:prstGeom prst="roundRect">
-            <a:avLst/>
-          </a:prstGeom>
-          <a:noFill/>
-          <a:ln w="19050">
-            <a:solidFill>
-              <a:srgbClr val="FFFF00"/>
-            </a:solidFill>
-            <a:prstDash val="dash"/>
-          </a:ln>
-        </p:spPr>
-        <p:style>
-          <a:lnRef idx="2">
-            <a:schemeClr val="accent1">
-              <a:shade val="50000"/>
-            </a:schemeClr>
-          </a:lnRef>
-          <a:fillRef idx="1">
-            <a:schemeClr val="accent1"/>
-          </a:fillRef>
-          <a:effectRef idx="0">
-            <a:schemeClr val="accent1"/>
-          </a:effectRef>
-          <a:fontRef idx="minor">
-            <a:schemeClr val="lt1"/>
-          </a:fontRef>
-        </p:style>
-        <p:txBody>
-          <a:bodyPr rtlCol="0" anchor="ctr"/>
-          <a:lstStyle/>
-          <a:p>
-            <a:pPr algn="ctr"/>
-            <a:endParaRPr lang="en-US"/>
-          </a:p>
-        </p:txBody>
-      </p:sp>
-      <p:pic>
-        <p:nvPicPr>
-          <p:cNvPr id="5" name="Picture 12" descr="HÃ¬nh áº£nh cÃ³ liÃªn quan"/>
-          <p:cNvPicPr>
-            <a:picLocks noChangeAspect="1" noChangeArrowheads="1"/>
-          </p:cNvPicPr>
-          <p:nvPr/>
-        </p:nvPicPr>
-        <p:blipFill>
-          <a:blip r:embed="rId2" cstate="print">
-            <a:extLst>
-              <a:ext uri="{28A0092B-C50C-407E-A947-70E740481C1C}">
-                <a14:useLocalDpi xmlns:a14="http://schemas.microsoft.com/office/drawing/2010/main" val="0"/>
-              </a:ext>
-            </a:extLst>
-          </a:blip>
-          <a:srcRect/>
-          <a:stretch>
-            <a:fillRect/>
-          </a:stretch>
-        </p:blipFill>
-        <p:spPr bwMode="auto">
-          <a:xfrm>
-            <a:off x="7727385" y="3714750"/>
-            <a:ext cx="1109238" cy="1109238"/>
-          </a:xfrm>
-          <a:prstGeom prst="rect">
-            <a:avLst/>
-          </a:prstGeom>
-          <a:ln>
-            <a:noFill/>
-          </a:ln>
-          <a:effectLst>
-            <a:outerShdw blurRad="292100" dist="139700" dir="2700000" algn="tl" rotWithShape="0">
-              <a:srgbClr val="333333">
-                <a:alpha val="65000"/>
-              </a:srgbClr>
-            </a:outerShdw>
-          </a:effectLst>
-          <a:extLst>
-            <a:ext uri="{909E8E84-426E-40DD-AFC4-6F175D3DCCD1}">
-              <a14:hiddenFill xmlns:a14="http://schemas.microsoft.com/office/drawing/2010/main">
-                <a:solidFill>
-                  <a:srgbClr val="FFFFFF"/>
-                </a:solidFill>
-              </a14:hiddenFill>
-            </a:ext>
-          </a:extLst>
-        </p:spPr>
-      </p:pic>
-      <p:grpSp>
-        <p:nvGrpSpPr>
-          <p:cNvPr id="6" name="Google Shape;622;p38"/>
-          <p:cNvGrpSpPr/>
-          <p:nvPr/>
-        </p:nvGrpSpPr>
-        <p:grpSpPr>
-          <a:xfrm>
-            <a:off x="8012833" y="145908"/>
-            <a:ext cx="697289" cy="685800"/>
-            <a:chOff x="1244325" y="4999400"/>
-            <a:chExt cx="444525" cy="437200"/>
-          </a:xfrm>
-        </p:grpSpPr>
-        <p:sp>
-          <p:nvSpPr>
-            <p:cNvPr id="7" name="Google Shape;623;p38"/>
-            <p:cNvSpPr/>
-            <p:nvPr/>
-          </p:nvSpPr>
-          <p:spPr>
-            <a:xfrm>
-              <a:off x="1244325" y="5161200"/>
-              <a:ext cx="374925" cy="222275"/>
-            </a:xfrm>
-            <a:custGeom>
-              <a:avLst/>
-              <a:gdLst/>
-              <a:ahLst/>
-              <a:cxnLst/>
-              <a:rect l="l" t="t" r="r" b="b"/>
-              <a:pathLst>
-                <a:path w="14997" h="8891" extrusionOk="0">
-                  <a:moveTo>
-                    <a:pt x="2077" y="1661"/>
-                  </a:moveTo>
-                  <a:lnTo>
-                    <a:pt x="2199" y="1685"/>
-                  </a:lnTo>
-                  <a:lnTo>
-                    <a:pt x="2468" y="1783"/>
-                  </a:lnTo>
-                  <a:lnTo>
-                    <a:pt x="2687" y="1930"/>
-                  </a:lnTo>
-                  <a:lnTo>
-                    <a:pt x="2883" y="2076"/>
-                  </a:lnTo>
-                  <a:lnTo>
-                    <a:pt x="2932" y="2443"/>
-                  </a:lnTo>
-                  <a:lnTo>
-                    <a:pt x="3005" y="2833"/>
-                  </a:lnTo>
-                  <a:lnTo>
-                    <a:pt x="3176" y="3664"/>
-                  </a:lnTo>
-                  <a:lnTo>
-                    <a:pt x="3396" y="4470"/>
-                  </a:lnTo>
-                  <a:lnTo>
-                    <a:pt x="3567" y="5154"/>
-                  </a:lnTo>
-                  <a:lnTo>
-                    <a:pt x="3371" y="5105"/>
-                  </a:lnTo>
-                  <a:lnTo>
-                    <a:pt x="3152" y="5031"/>
-                  </a:lnTo>
-                  <a:lnTo>
-                    <a:pt x="2956" y="4934"/>
-                  </a:lnTo>
-                  <a:lnTo>
-                    <a:pt x="2736" y="4812"/>
-                  </a:lnTo>
-                  <a:lnTo>
-                    <a:pt x="2541" y="4690"/>
-                  </a:lnTo>
-                  <a:lnTo>
-                    <a:pt x="2321" y="4543"/>
-                  </a:lnTo>
-                  <a:lnTo>
-                    <a:pt x="2126" y="4372"/>
-                  </a:lnTo>
-                  <a:lnTo>
-                    <a:pt x="1930" y="4201"/>
-                  </a:lnTo>
-                  <a:lnTo>
-                    <a:pt x="1759" y="4006"/>
-                  </a:lnTo>
-                  <a:lnTo>
-                    <a:pt x="1613" y="3810"/>
-                  </a:lnTo>
-                  <a:lnTo>
-                    <a:pt x="1466" y="3590"/>
-                  </a:lnTo>
-                  <a:lnTo>
-                    <a:pt x="1344" y="3395"/>
-                  </a:lnTo>
-                  <a:lnTo>
-                    <a:pt x="1247" y="3175"/>
-                  </a:lnTo>
-                  <a:lnTo>
-                    <a:pt x="1173" y="2931"/>
-                  </a:lnTo>
-                  <a:lnTo>
-                    <a:pt x="1124" y="2711"/>
-                  </a:lnTo>
-                  <a:lnTo>
-                    <a:pt x="1124" y="2491"/>
-                  </a:lnTo>
-                  <a:lnTo>
-                    <a:pt x="1124" y="2320"/>
-                  </a:lnTo>
-                  <a:lnTo>
-                    <a:pt x="1173" y="2174"/>
-                  </a:lnTo>
-                  <a:lnTo>
-                    <a:pt x="1247" y="2027"/>
-                  </a:lnTo>
-                  <a:lnTo>
-                    <a:pt x="1369" y="1905"/>
-                  </a:lnTo>
-                  <a:lnTo>
-                    <a:pt x="1491" y="1808"/>
-                  </a:lnTo>
-                  <a:lnTo>
-                    <a:pt x="1613" y="1734"/>
-                  </a:lnTo>
-                  <a:lnTo>
-                    <a:pt x="1784" y="1685"/>
-                  </a:lnTo>
-                  <a:lnTo>
-                    <a:pt x="1955" y="1661"/>
-                  </a:lnTo>
-                  <a:close/>
-                  <a:moveTo>
-                    <a:pt x="3225" y="0"/>
-                  </a:moveTo>
-                  <a:lnTo>
-                    <a:pt x="3127" y="25"/>
-                  </a:lnTo>
-                  <a:lnTo>
-                    <a:pt x="3029" y="98"/>
-                  </a:lnTo>
-                  <a:lnTo>
-                    <a:pt x="2932" y="147"/>
-                  </a:lnTo>
-                  <a:lnTo>
-                    <a:pt x="2883" y="245"/>
-                  </a:lnTo>
-                  <a:lnTo>
-                    <a:pt x="2834" y="342"/>
-                  </a:lnTo>
-                  <a:lnTo>
-                    <a:pt x="2785" y="440"/>
-                  </a:lnTo>
-                  <a:lnTo>
-                    <a:pt x="2785" y="538"/>
-                  </a:lnTo>
-                  <a:lnTo>
-                    <a:pt x="2785" y="709"/>
-                  </a:lnTo>
-                  <a:lnTo>
-                    <a:pt x="2565" y="635"/>
-                  </a:lnTo>
-                  <a:lnTo>
-                    <a:pt x="2370" y="586"/>
-                  </a:lnTo>
-                  <a:lnTo>
-                    <a:pt x="2150" y="562"/>
-                  </a:lnTo>
-                  <a:lnTo>
-                    <a:pt x="1955" y="538"/>
-                  </a:lnTo>
-                  <a:lnTo>
-                    <a:pt x="1759" y="562"/>
-                  </a:lnTo>
-                  <a:lnTo>
-                    <a:pt x="1564" y="586"/>
-                  </a:lnTo>
-                  <a:lnTo>
-                    <a:pt x="1369" y="635"/>
-                  </a:lnTo>
-                  <a:lnTo>
-                    <a:pt x="1198" y="709"/>
-                  </a:lnTo>
-                  <a:lnTo>
-                    <a:pt x="1027" y="782"/>
-                  </a:lnTo>
-                  <a:lnTo>
-                    <a:pt x="856" y="880"/>
-                  </a:lnTo>
-                  <a:lnTo>
-                    <a:pt x="709" y="1002"/>
-                  </a:lnTo>
-                  <a:lnTo>
-                    <a:pt x="563" y="1124"/>
-                  </a:lnTo>
-                  <a:lnTo>
-                    <a:pt x="441" y="1246"/>
-                  </a:lnTo>
-                  <a:lnTo>
-                    <a:pt x="343" y="1417"/>
-                  </a:lnTo>
-                  <a:lnTo>
-                    <a:pt x="245" y="1563"/>
-                  </a:lnTo>
-                  <a:lnTo>
-                    <a:pt x="147" y="1734"/>
-                  </a:lnTo>
-                  <a:lnTo>
-                    <a:pt x="99" y="1905"/>
-                  </a:lnTo>
-                  <a:lnTo>
-                    <a:pt x="50" y="2101"/>
-                  </a:lnTo>
-                  <a:lnTo>
-                    <a:pt x="1" y="2296"/>
-                  </a:lnTo>
-                  <a:lnTo>
-                    <a:pt x="1" y="2491"/>
-                  </a:lnTo>
-                  <a:lnTo>
-                    <a:pt x="25" y="2858"/>
-                  </a:lnTo>
-                  <a:lnTo>
-                    <a:pt x="99" y="3200"/>
-                  </a:lnTo>
-                  <a:lnTo>
-                    <a:pt x="221" y="3566"/>
-                  </a:lnTo>
-                  <a:lnTo>
-                    <a:pt x="367" y="3884"/>
-                  </a:lnTo>
-                  <a:lnTo>
-                    <a:pt x="563" y="4225"/>
-                  </a:lnTo>
-                  <a:lnTo>
-                    <a:pt x="782" y="4543"/>
-                  </a:lnTo>
-                  <a:lnTo>
-                    <a:pt x="1027" y="4836"/>
-                  </a:lnTo>
-                  <a:lnTo>
-                    <a:pt x="1295" y="5105"/>
-                  </a:lnTo>
-                  <a:lnTo>
-                    <a:pt x="1588" y="5349"/>
-                  </a:lnTo>
-                  <a:lnTo>
-                    <a:pt x="1906" y="5593"/>
-                  </a:lnTo>
-                  <a:lnTo>
-                    <a:pt x="2248" y="5789"/>
-                  </a:lnTo>
-                  <a:lnTo>
-                    <a:pt x="2590" y="5960"/>
-                  </a:lnTo>
-                  <a:lnTo>
-                    <a:pt x="2932" y="6106"/>
-                  </a:lnTo>
-                  <a:lnTo>
-                    <a:pt x="3274" y="6204"/>
-                  </a:lnTo>
-                  <a:lnTo>
-                    <a:pt x="3616" y="6277"/>
-                  </a:lnTo>
-                  <a:lnTo>
-                    <a:pt x="3957" y="6301"/>
-                  </a:lnTo>
-                  <a:lnTo>
-                    <a:pt x="4080" y="6643"/>
-                  </a:lnTo>
-                  <a:lnTo>
-                    <a:pt x="4226" y="6961"/>
-                  </a:lnTo>
-                  <a:lnTo>
-                    <a:pt x="4519" y="7596"/>
-                  </a:lnTo>
-                  <a:lnTo>
-                    <a:pt x="4812" y="8133"/>
-                  </a:lnTo>
-                  <a:lnTo>
-                    <a:pt x="5081" y="8597"/>
-                  </a:lnTo>
-                  <a:lnTo>
-                    <a:pt x="5154" y="8719"/>
-                  </a:lnTo>
-                  <a:lnTo>
-                    <a:pt x="5276" y="8817"/>
-                  </a:lnTo>
-                  <a:lnTo>
-                    <a:pt x="5423" y="8866"/>
-                  </a:lnTo>
-                  <a:lnTo>
-                    <a:pt x="5569" y="8890"/>
-                  </a:lnTo>
-                  <a:lnTo>
-                    <a:pt x="12212" y="8890"/>
-                  </a:lnTo>
-                  <a:lnTo>
-                    <a:pt x="12359" y="8866"/>
-                  </a:lnTo>
-                  <a:lnTo>
-                    <a:pt x="12506" y="8817"/>
-                  </a:lnTo>
-                  <a:lnTo>
-                    <a:pt x="12628" y="8719"/>
-                  </a:lnTo>
-                  <a:lnTo>
-                    <a:pt x="12701" y="8597"/>
-                  </a:lnTo>
-                  <a:lnTo>
-                    <a:pt x="12994" y="8060"/>
-                  </a:lnTo>
-                  <a:lnTo>
-                    <a:pt x="13360" y="7352"/>
-                  </a:lnTo>
-                  <a:lnTo>
-                    <a:pt x="13727" y="6472"/>
-                  </a:lnTo>
-                  <a:lnTo>
-                    <a:pt x="13922" y="6008"/>
-                  </a:lnTo>
-                  <a:lnTo>
-                    <a:pt x="14117" y="5495"/>
-                  </a:lnTo>
-                  <a:lnTo>
-                    <a:pt x="14288" y="4958"/>
-                  </a:lnTo>
-                  <a:lnTo>
-                    <a:pt x="14459" y="4372"/>
-                  </a:lnTo>
-                  <a:lnTo>
-                    <a:pt x="14606" y="3786"/>
-                  </a:lnTo>
-                  <a:lnTo>
-                    <a:pt x="14752" y="3175"/>
-                  </a:lnTo>
-                  <a:lnTo>
-                    <a:pt x="14850" y="2540"/>
-                  </a:lnTo>
-                  <a:lnTo>
-                    <a:pt x="14923" y="1881"/>
-                  </a:lnTo>
-                  <a:lnTo>
-                    <a:pt x="14972" y="1221"/>
-                  </a:lnTo>
-                  <a:lnTo>
-                    <a:pt x="14997" y="538"/>
-                  </a:lnTo>
-                  <a:lnTo>
-                    <a:pt x="14997" y="440"/>
-                  </a:lnTo>
-                  <a:lnTo>
-                    <a:pt x="14948" y="342"/>
-                  </a:lnTo>
-                  <a:lnTo>
-                    <a:pt x="14899" y="245"/>
-                  </a:lnTo>
-                  <a:lnTo>
-                    <a:pt x="14850" y="147"/>
-                  </a:lnTo>
-                  <a:lnTo>
-                    <a:pt x="14752" y="98"/>
-                  </a:lnTo>
-                  <a:lnTo>
-                    <a:pt x="14655" y="25"/>
-                  </a:lnTo>
-                  <a:lnTo>
-                    <a:pt x="14557" y="0"/>
-                  </a:lnTo>
-                  <a:close/>
-                </a:path>
-              </a:pathLst>
-            </a:custGeom>
-            <a:solidFill>
-              <a:srgbClr val="FFB600"/>
-            </a:solidFill>
-            <a:ln>
-              <a:noFill/>
-            </a:ln>
-          </p:spPr>
-          <p:txBody>
-            <a:bodyPr spcFirstLastPara="1" wrap="square" lIns="91425" tIns="91425" rIns="91425" bIns="91425" anchor="ctr" anchorCtr="0">
-              <a:noAutofit/>
-            </a:bodyPr>
-            <a:lstStyle/>
-            <a:p>
-              <a:pPr marL="0" lvl="0" indent="0" algn="l" rtl="0">
-                <a:spcBef>
-                  <a:spcPts val="0"/>
-                </a:spcBef>
-                <a:spcAft>
-                  <a:spcPts val="0"/>
-                </a:spcAft>
-                <a:buNone/>
-              </a:pPr>
-              <a:endParaRPr/>
-            </a:p>
-          </p:txBody>
-        </p:sp>
-        <p:sp>
-          <p:nvSpPr>
-            <p:cNvPr id="8" name="Google Shape;624;p38"/>
-            <p:cNvSpPr/>
-            <p:nvPr/>
-          </p:nvSpPr>
-          <p:spPr>
-            <a:xfrm>
-              <a:off x="1244325" y="5397500"/>
-              <a:ext cx="444525" cy="39100"/>
-            </a:xfrm>
-            <a:custGeom>
-              <a:avLst/>
-              <a:gdLst/>
-              <a:ahLst/>
-              <a:cxnLst/>
-              <a:rect l="l" t="t" r="r" b="b"/>
-              <a:pathLst>
-                <a:path w="17781" h="1564" extrusionOk="0">
-                  <a:moveTo>
-                    <a:pt x="1" y="0"/>
-                  </a:moveTo>
-                  <a:lnTo>
-                    <a:pt x="25" y="244"/>
-                  </a:lnTo>
-                  <a:lnTo>
-                    <a:pt x="99" y="488"/>
-                  </a:lnTo>
-                  <a:lnTo>
-                    <a:pt x="196" y="757"/>
-                  </a:lnTo>
-                  <a:lnTo>
-                    <a:pt x="318" y="1001"/>
-                  </a:lnTo>
-                  <a:lnTo>
-                    <a:pt x="489" y="1221"/>
-                  </a:lnTo>
-                  <a:lnTo>
-                    <a:pt x="685" y="1392"/>
-                  </a:lnTo>
-                  <a:lnTo>
-                    <a:pt x="782" y="1465"/>
-                  </a:lnTo>
-                  <a:lnTo>
-                    <a:pt x="880" y="1514"/>
-                  </a:lnTo>
-                  <a:lnTo>
-                    <a:pt x="1002" y="1539"/>
-                  </a:lnTo>
-                  <a:lnTo>
-                    <a:pt x="1124" y="1563"/>
-                  </a:lnTo>
-                  <a:lnTo>
-                    <a:pt x="16657" y="1563"/>
-                  </a:lnTo>
-                  <a:lnTo>
-                    <a:pt x="16780" y="1539"/>
-                  </a:lnTo>
-                  <a:lnTo>
-                    <a:pt x="16902" y="1514"/>
-                  </a:lnTo>
-                  <a:lnTo>
-                    <a:pt x="16999" y="1465"/>
-                  </a:lnTo>
-                  <a:lnTo>
-                    <a:pt x="17097" y="1392"/>
-                  </a:lnTo>
-                  <a:lnTo>
-                    <a:pt x="17292" y="1221"/>
-                  </a:lnTo>
-                  <a:lnTo>
-                    <a:pt x="17463" y="1001"/>
-                  </a:lnTo>
-                  <a:lnTo>
-                    <a:pt x="17586" y="757"/>
-                  </a:lnTo>
-                  <a:lnTo>
-                    <a:pt x="17683" y="488"/>
-                  </a:lnTo>
-                  <a:lnTo>
-                    <a:pt x="17756" y="244"/>
-                  </a:lnTo>
-                  <a:lnTo>
-                    <a:pt x="17781" y="0"/>
-                  </a:lnTo>
-                  <a:close/>
-                </a:path>
-              </a:pathLst>
-            </a:custGeom>
-            <a:solidFill>
-              <a:srgbClr val="FFB600"/>
-            </a:solidFill>
-            <a:ln>
-              <a:noFill/>
-            </a:ln>
-          </p:spPr>
-          <p:txBody>
-            <a:bodyPr spcFirstLastPara="1" wrap="square" lIns="91425" tIns="91425" rIns="91425" bIns="91425" anchor="ctr" anchorCtr="0">
-              <a:noAutofit/>
-            </a:bodyPr>
-            <a:lstStyle/>
-            <a:p>
-              <a:pPr marL="0" lvl="0" indent="0" algn="l" rtl="0">
-                <a:spcBef>
-                  <a:spcPts val="0"/>
-                </a:spcBef>
-                <a:spcAft>
-                  <a:spcPts val="0"/>
-                </a:spcAft>
-                <a:buNone/>
-              </a:pPr>
-              <a:endParaRPr/>
-            </a:p>
-          </p:txBody>
-        </p:sp>
-        <p:sp>
-          <p:nvSpPr>
-            <p:cNvPr id="9" name="Google Shape;625;p38"/>
-            <p:cNvSpPr/>
-            <p:nvPr/>
-          </p:nvSpPr>
-          <p:spPr>
-            <a:xfrm>
-              <a:off x="1451925" y="4999400"/>
-              <a:ext cx="31175" cy="129450"/>
-            </a:xfrm>
-            <a:custGeom>
-              <a:avLst/>
-              <a:gdLst/>
-              <a:ahLst/>
-              <a:cxnLst/>
-              <a:rect l="l" t="t" r="r" b="b"/>
-              <a:pathLst>
-                <a:path w="1247" h="5178" extrusionOk="0">
-                  <a:moveTo>
-                    <a:pt x="953" y="0"/>
-                  </a:moveTo>
-                  <a:lnTo>
-                    <a:pt x="856" y="25"/>
-                  </a:lnTo>
-                  <a:lnTo>
-                    <a:pt x="758" y="98"/>
-                  </a:lnTo>
-                  <a:lnTo>
-                    <a:pt x="709" y="171"/>
-                  </a:lnTo>
-                  <a:lnTo>
-                    <a:pt x="685" y="293"/>
-                  </a:lnTo>
-                  <a:lnTo>
-                    <a:pt x="660" y="464"/>
-                  </a:lnTo>
-                  <a:lnTo>
-                    <a:pt x="611" y="611"/>
-                  </a:lnTo>
-                  <a:lnTo>
-                    <a:pt x="514" y="733"/>
-                  </a:lnTo>
-                  <a:lnTo>
-                    <a:pt x="416" y="879"/>
-                  </a:lnTo>
-                  <a:lnTo>
-                    <a:pt x="269" y="1026"/>
-                  </a:lnTo>
-                  <a:lnTo>
-                    <a:pt x="147" y="1246"/>
-                  </a:lnTo>
-                  <a:lnTo>
-                    <a:pt x="74" y="1368"/>
-                  </a:lnTo>
-                  <a:lnTo>
-                    <a:pt x="50" y="1490"/>
-                  </a:lnTo>
-                  <a:lnTo>
-                    <a:pt x="1" y="1661"/>
-                  </a:lnTo>
-                  <a:lnTo>
-                    <a:pt x="1" y="1832"/>
-                  </a:lnTo>
-                  <a:lnTo>
-                    <a:pt x="1" y="2003"/>
-                  </a:lnTo>
-                  <a:lnTo>
-                    <a:pt x="50" y="2149"/>
-                  </a:lnTo>
-                  <a:lnTo>
-                    <a:pt x="74" y="2296"/>
-                  </a:lnTo>
-                  <a:lnTo>
-                    <a:pt x="147" y="2394"/>
-                  </a:lnTo>
-                  <a:lnTo>
-                    <a:pt x="269" y="2613"/>
-                  </a:lnTo>
-                  <a:lnTo>
-                    <a:pt x="416" y="2784"/>
-                  </a:lnTo>
-                  <a:lnTo>
-                    <a:pt x="514" y="2907"/>
-                  </a:lnTo>
-                  <a:lnTo>
-                    <a:pt x="611" y="3029"/>
-                  </a:lnTo>
-                  <a:lnTo>
-                    <a:pt x="660" y="3175"/>
-                  </a:lnTo>
-                  <a:lnTo>
-                    <a:pt x="685" y="3346"/>
-                  </a:lnTo>
-                  <a:lnTo>
-                    <a:pt x="660" y="3542"/>
-                  </a:lnTo>
-                  <a:lnTo>
-                    <a:pt x="611" y="3688"/>
-                  </a:lnTo>
-                  <a:lnTo>
-                    <a:pt x="514" y="3810"/>
-                  </a:lnTo>
-                  <a:lnTo>
-                    <a:pt x="416" y="3932"/>
-                  </a:lnTo>
-                  <a:lnTo>
-                    <a:pt x="269" y="4103"/>
-                  </a:lnTo>
-                  <a:lnTo>
-                    <a:pt x="147" y="4299"/>
-                  </a:lnTo>
-                  <a:lnTo>
-                    <a:pt x="74" y="4421"/>
-                  </a:lnTo>
-                  <a:lnTo>
-                    <a:pt x="50" y="4567"/>
-                  </a:lnTo>
-                  <a:lnTo>
-                    <a:pt x="1" y="4714"/>
-                  </a:lnTo>
-                  <a:lnTo>
-                    <a:pt x="1" y="4885"/>
-                  </a:lnTo>
-                  <a:lnTo>
-                    <a:pt x="25" y="5007"/>
-                  </a:lnTo>
-                  <a:lnTo>
-                    <a:pt x="74" y="5080"/>
-                  </a:lnTo>
-                  <a:lnTo>
-                    <a:pt x="172" y="5153"/>
-                  </a:lnTo>
-                  <a:lnTo>
-                    <a:pt x="294" y="5178"/>
-                  </a:lnTo>
-                  <a:lnTo>
-                    <a:pt x="392" y="5153"/>
-                  </a:lnTo>
-                  <a:lnTo>
-                    <a:pt x="489" y="5080"/>
-                  </a:lnTo>
-                  <a:lnTo>
-                    <a:pt x="538" y="5007"/>
-                  </a:lnTo>
-                  <a:lnTo>
-                    <a:pt x="563" y="4885"/>
-                  </a:lnTo>
-                  <a:lnTo>
-                    <a:pt x="587" y="4714"/>
-                  </a:lnTo>
-                  <a:lnTo>
-                    <a:pt x="636" y="4567"/>
-                  </a:lnTo>
-                  <a:lnTo>
-                    <a:pt x="733" y="4445"/>
-                  </a:lnTo>
-                  <a:lnTo>
-                    <a:pt x="831" y="4299"/>
-                  </a:lnTo>
-                  <a:lnTo>
-                    <a:pt x="978" y="4152"/>
-                  </a:lnTo>
-                  <a:lnTo>
-                    <a:pt x="1100" y="3932"/>
-                  </a:lnTo>
-                  <a:lnTo>
-                    <a:pt x="1149" y="3810"/>
-                  </a:lnTo>
-                  <a:lnTo>
-                    <a:pt x="1197" y="3688"/>
-                  </a:lnTo>
-                  <a:lnTo>
-                    <a:pt x="1222" y="3542"/>
-                  </a:lnTo>
-                  <a:lnTo>
-                    <a:pt x="1246" y="3346"/>
-                  </a:lnTo>
-                  <a:lnTo>
-                    <a:pt x="1222" y="3175"/>
-                  </a:lnTo>
-                  <a:lnTo>
-                    <a:pt x="1197" y="3029"/>
-                  </a:lnTo>
-                  <a:lnTo>
-                    <a:pt x="1149" y="2882"/>
-                  </a:lnTo>
-                  <a:lnTo>
-                    <a:pt x="1100" y="2784"/>
-                  </a:lnTo>
-                  <a:lnTo>
-                    <a:pt x="978" y="2565"/>
-                  </a:lnTo>
-                  <a:lnTo>
-                    <a:pt x="831" y="2394"/>
-                  </a:lnTo>
-                  <a:lnTo>
-                    <a:pt x="733" y="2272"/>
-                  </a:lnTo>
-                  <a:lnTo>
-                    <a:pt x="636" y="2149"/>
-                  </a:lnTo>
-                  <a:lnTo>
-                    <a:pt x="587" y="2003"/>
-                  </a:lnTo>
-                  <a:lnTo>
-                    <a:pt x="563" y="1832"/>
-                  </a:lnTo>
-                  <a:lnTo>
-                    <a:pt x="587" y="1637"/>
-                  </a:lnTo>
-                  <a:lnTo>
-                    <a:pt x="636" y="1490"/>
-                  </a:lnTo>
-                  <a:lnTo>
-                    <a:pt x="733" y="1368"/>
-                  </a:lnTo>
-                  <a:lnTo>
-                    <a:pt x="831" y="1246"/>
-                  </a:lnTo>
-                  <a:lnTo>
-                    <a:pt x="978" y="1075"/>
-                  </a:lnTo>
-                  <a:lnTo>
-                    <a:pt x="1100" y="879"/>
-                  </a:lnTo>
-                  <a:lnTo>
-                    <a:pt x="1149" y="757"/>
-                  </a:lnTo>
-                  <a:lnTo>
-                    <a:pt x="1197" y="611"/>
-                  </a:lnTo>
-                  <a:lnTo>
-                    <a:pt x="1222" y="464"/>
-                  </a:lnTo>
-                  <a:lnTo>
-                    <a:pt x="1246" y="293"/>
-                  </a:lnTo>
-                  <a:lnTo>
-                    <a:pt x="1222" y="171"/>
-                  </a:lnTo>
-                  <a:lnTo>
-                    <a:pt x="1149" y="98"/>
-                  </a:lnTo>
-                  <a:lnTo>
-                    <a:pt x="1075" y="25"/>
-                  </a:lnTo>
-                  <a:lnTo>
-                    <a:pt x="953" y="0"/>
-                  </a:lnTo>
-                  <a:close/>
-                </a:path>
-              </a:pathLst>
-            </a:custGeom>
-            <a:solidFill>
-              <a:srgbClr val="FFB600"/>
-            </a:solidFill>
-            <a:ln>
-              <a:noFill/>
-            </a:ln>
-          </p:spPr>
-          <p:txBody>
-            <a:bodyPr spcFirstLastPara="1" wrap="square" lIns="91425" tIns="91425" rIns="91425" bIns="91425" anchor="ctr" anchorCtr="0">
-              <a:noAutofit/>
-            </a:bodyPr>
-            <a:lstStyle/>
-            <a:p>
-              <a:pPr marL="0" lvl="0" indent="0" algn="l" rtl="0">
-                <a:spcBef>
-                  <a:spcPts val="0"/>
-                </a:spcBef>
-                <a:spcAft>
-                  <a:spcPts val="0"/>
-                </a:spcAft>
-                <a:buNone/>
-              </a:pPr>
-              <a:endParaRPr/>
-            </a:p>
-          </p:txBody>
-        </p:sp>
-        <p:sp>
-          <p:nvSpPr>
-            <p:cNvPr id="10" name="Google Shape;626;p38"/>
-            <p:cNvSpPr/>
-            <p:nvPr/>
-          </p:nvSpPr>
-          <p:spPr>
-            <a:xfrm>
-              <a:off x="1407975" y="4999400"/>
-              <a:ext cx="31150" cy="129450"/>
-            </a:xfrm>
-            <a:custGeom>
-              <a:avLst/>
-              <a:gdLst/>
-              <a:ahLst/>
-              <a:cxnLst/>
-              <a:rect l="l" t="t" r="r" b="b"/>
-              <a:pathLst>
-                <a:path w="1246" h="5178" extrusionOk="0">
-                  <a:moveTo>
-                    <a:pt x="977" y="0"/>
-                  </a:moveTo>
-                  <a:lnTo>
-                    <a:pt x="855" y="25"/>
-                  </a:lnTo>
-                  <a:lnTo>
-                    <a:pt x="782" y="98"/>
-                  </a:lnTo>
-                  <a:lnTo>
-                    <a:pt x="709" y="171"/>
-                  </a:lnTo>
-                  <a:lnTo>
-                    <a:pt x="684" y="293"/>
-                  </a:lnTo>
-                  <a:lnTo>
-                    <a:pt x="660" y="464"/>
-                  </a:lnTo>
-                  <a:lnTo>
-                    <a:pt x="611" y="611"/>
-                  </a:lnTo>
-                  <a:lnTo>
-                    <a:pt x="538" y="733"/>
-                  </a:lnTo>
-                  <a:lnTo>
-                    <a:pt x="416" y="879"/>
-                  </a:lnTo>
-                  <a:lnTo>
-                    <a:pt x="269" y="1026"/>
-                  </a:lnTo>
-                  <a:lnTo>
-                    <a:pt x="147" y="1246"/>
-                  </a:lnTo>
-                  <a:lnTo>
-                    <a:pt x="98" y="1368"/>
-                  </a:lnTo>
-                  <a:lnTo>
-                    <a:pt x="49" y="1490"/>
-                  </a:lnTo>
-                  <a:lnTo>
-                    <a:pt x="25" y="1661"/>
-                  </a:lnTo>
-                  <a:lnTo>
-                    <a:pt x="0" y="1832"/>
-                  </a:lnTo>
-                  <a:lnTo>
-                    <a:pt x="25" y="2003"/>
-                  </a:lnTo>
-                  <a:lnTo>
-                    <a:pt x="49" y="2149"/>
-                  </a:lnTo>
-                  <a:lnTo>
-                    <a:pt x="98" y="2296"/>
-                  </a:lnTo>
-                  <a:lnTo>
-                    <a:pt x="147" y="2394"/>
-                  </a:lnTo>
-                  <a:lnTo>
-                    <a:pt x="269" y="2613"/>
-                  </a:lnTo>
-                  <a:lnTo>
-                    <a:pt x="416" y="2784"/>
-                  </a:lnTo>
-                  <a:lnTo>
-                    <a:pt x="538" y="2907"/>
-                  </a:lnTo>
-                  <a:lnTo>
-                    <a:pt x="611" y="3029"/>
-                  </a:lnTo>
-                  <a:lnTo>
-                    <a:pt x="660" y="3175"/>
-                  </a:lnTo>
-                  <a:lnTo>
-                    <a:pt x="684" y="3346"/>
-                  </a:lnTo>
-                  <a:lnTo>
-                    <a:pt x="660" y="3542"/>
-                  </a:lnTo>
-                  <a:lnTo>
-                    <a:pt x="611" y="3688"/>
-                  </a:lnTo>
-                  <a:lnTo>
-                    <a:pt x="538" y="3810"/>
-                  </a:lnTo>
-                  <a:lnTo>
-                    <a:pt x="416" y="3932"/>
-                  </a:lnTo>
-                  <a:lnTo>
-                    <a:pt x="269" y="4103"/>
-                  </a:lnTo>
-                  <a:lnTo>
-                    <a:pt x="147" y="4299"/>
-                  </a:lnTo>
-                  <a:lnTo>
-                    <a:pt x="98" y="4421"/>
-                  </a:lnTo>
-                  <a:lnTo>
-                    <a:pt x="49" y="4567"/>
-                  </a:lnTo>
-                  <a:lnTo>
-                    <a:pt x="25" y="4714"/>
-                  </a:lnTo>
-                  <a:lnTo>
-                    <a:pt x="0" y="4885"/>
-                  </a:lnTo>
-                  <a:lnTo>
-                    <a:pt x="25" y="5007"/>
-                  </a:lnTo>
-                  <a:lnTo>
-                    <a:pt x="98" y="5080"/>
-                  </a:lnTo>
-                  <a:lnTo>
-                    <a:pt x="171" y="5153"/>
-                  </a:lnTo>
-                  <a:lnTo>
-                    <a:pt x="293" y="5178"/>
-                  </a:lnTo>
-                  <a:lnTo>
-                    <a:pt x="391" y="5153"/>
-                  </a:lnTo>
-                  <a:lnTo>
-                    <a:pt x="489" y="5080"/>
-                  </a:lnTo>
-                  <a:lnTo>
-                    <a:pt x="562" y="5007"/>
-                  </a:lnTo>
-                  <a:lnTo>
-                    <a:pt x="586" y="4885"/>
-                  </a:lnTo>
-                  <a:lnTo>
-                    <a:pt x="586" y="4714"/>
-                  </a:lnTo>
-                  <a:lnTo>
-                    <a:pt x="660" y="4567"/>
-                  </a:lnTo>
-                  <a:lnTo>
-                    <a:pt x="733" y="4445"/>
-                  </a:lnTo>
-                  <a:lnTo>
-                    <a:pt x="831" y="4299"/>
-                  </a:lnTo>
-                  <a:lnTo>
-                    <a:pt x="977" y="4152"/>
-                  </a:lnTo>
-                  <a:lnTo>
-                    <a:pt x="1124" y="3932"/>
-                  </a:lnTo>
-                  <a:lnTo>
-                    <a:pt x="1173" y="3810"/>
-                  </a:lnTo>
-                  <a:lnTo>
-                    <a:pt x="1221" y="3688"/>
-                  </a:lnTo>
-                  <a:lnTo>
-                    <a:pt x="1246" y="3542"/>
-                  </a:lnTo>
-                  <a:lnTo>
-                    <a:pt x="1246" y="3346"/>
-                  </a:lnTo>
-                  <a:lnTo>
-                    <a:pt x="1246" y="3175"/>
-                  </a:lnTo>
-                  <a:lnTo>
-                    <a:pt x="1221" y="3029"/>
-                  </a:lnTo>
-                  <a:lnTo>
-                    <a:pt x="1173" y="2882"/>
-                  </a:lnTo>
-                  <a:lnTo>
-                    <a:pt x="1124" y="2784"/>
-                  </a:lnTo>
-                  <a:lnTo>
-                    <a:pt x="977" y="2565"/>
-                  </a:lnTo>
-                  <a:lnTo>
-                    <a:pt x="831" y="2394"/>
-                  </a:lnTo>
-                  <a:lnTo>
-                    <a:pt x="733" y="2272"/>
-                  </a:lnTo>
-                  <a:lnTo>
-                    <a:pt x="660" y="2149"/>
-                  </a:lnTo>
-                  <a:lnTo>
-                    <a:pt x="586" y="2003"/>
-                  </a:lnTo>
-                  <a:lnTo>
-                    <a:pt x="586" y="1832"/>
-                  </a:lnTo>
-                  <a:lnTo>
-                    <a:pt x="586" y="1637"/>
-                  </a:lnTo>
-                  <a:lnTo>
-                    <a:pt x="660" y="1490"/>
-                  </a:lnTo>
-                  <a:lnTo>
-                    <a:pt x="733" y="1368"/>
-                  </a:lnTo>
-                  <a:lnTo>
-                    <a:pt x="831" y="1246"/>
-                  </a:lnTo>
-                  <a:lnTo>
-                    <a:pt x="977" y="1075"/>
-                  </a:lnTo>
-                  <a:lnTo>
-                    <a:pt x="1124" y="879"/>
-                  </a:lnTo>
-                  <a:lnTo>
-                    <a:pt x="1173" y="757"/>
-                  </a:lnTo>
-                  <a:lnTo>
-                    <a:pt x="1221" y="611"/>
-                  </a:lnTo>
-                  <a:lnTo>
-                    <a:pt x="1246" y="464"/>
-                  </a:lnTo>
-                  <a:lnTo>
-                    <a:pt x="1246" y="293"/>
-                  </a:lnTo>
-                  <a:lnTo>
-                    <a:pt x="1221" y="171"/>
-                  </a:lnTo>
-                  <a:lnTo>
-                    <a:pt x="1173" y="98"/>
-                  </a:lnTo>
-                  <a:lnTo>
-                    <a:pt x="1075" y="25"/>
-                  </a:lnTo>
-                  <a:lnTo>
-                    <a:pt x="977" y="0"/>
-                  </a:lnTo>
-                  <a:close/>
-                </a:path>
-              </a:pathLst>
-            </a:custGeom>
-            <a:solidFill>
-              <a:srgbClr val="FFB600"/>
-            </a:solidFill>
-            <a:ln>
-              <a:noFill/>
-            </a:ln>
-          </p:spPr>
-          <p:txBody>
-            <a:bodyPr spcFirstLastPara="1" wrap="square" lIns="91425" tIns="91425" rIns="91425" bIns="91425" anchor="ctr" anchorCtr="0">
-              <a:noAutofit/>
-            </a:bodyPr>
-            <a:lstStyle/>
-            <a:p>
-              <a:pPr marL="0" lvl="0" indent="0" algn="l" rtl="0">
-                <a:spcBef>
-                  <a:spcPts val="0"/>
-                </a:spcBef>
-                <a:spcAft>
-                  <a:spcPts val="0"/>
-                </a:spcAft>
-                <a:buNone/>
-              </a:pPr>
-              <a:endParaRPr/>
-            </a:p>
-          </p:txBody>
-        </p:sp>
-        <p:sp>
-          <p:nvSpPr>
-            <p:cNvPr id="11" name="Google Shape;627;p38"/>
-            <p:cNvSpPr/>
-            <p:nvPr/>
-          </p:nvSpPr>
-          <p:spPr>
-            <a:xfrm>
-              <a:off x="1495900" y="4999400"/>
-              <a:ext cx="30550" cy="129450"/>
-            </a:xfrm>
-            <a:custGeom>
-              <a:avLst/>
-              <a:gdLst/>
-              <a:ahLst/>
-              <a:cxnLst/>
-              <a:rect l="l" t="t" r="r" b="b"/>
-              <a:pathLst>
-                <a:path w="1222" h="5178" extrusionOk="0">
-                  <a:moveTo>
-                    <a:pt x="953" y="0"/>
-                  </a:moveTo>
-                  <a:lnTo>
-                    <a:pt x="831" y="25"/>
-                  </a:lnTo>
-                  <a:lnTo>
-                    <a:pt x="757" y="98"/>
-                  </a:lnTo>
-                  <a:lnTo>
-                    <a:pt x="684" y="171"/>
-                  </a:lnTo>
-                  <a:lnTo>
-                    <a:pt x="660" y="293"/>
-                  </a:lnTo>
-                  <a:lnTo>
-                    <a:pt x="660" y="464"/>
-                  </a:lnTo>
-                  <a:lnTo>
-                    <a:pt x="586" y="611"/>
-                  </a:lnTo>
-                  <a:lnTo>
-                    <a:pt x="513" y="733"/>
-                  </a:lnTo>
-                  <a:lnTo>
-                    <a:pt x="391" y="879"/>
-                  </a:lnTo>
-                  <a:lnTo>
-                    <a:pt x="269" y="1026"/>
-                  </a:lnTo>
-                  <a:lnTo>
-                    <a:pt x="122" y="1246"/>
-                  </a:lnTo>
-                  <a:lnTo>
-                    <a:pt x="73" y="1368"/>
-                  </a:lnTo>
-                  <a:lnTo>
-                    <a:pt x="25" y="1490"/>
-                  </a:lnTo>
-                  <a:lnTo>
-                    <a:pt x="0" y="1661"/>
-                  </a:lnTo>
-                  <a:lnTo>
-                    <a:pt x="0" y="1832"/>
-                  </a:lnTo>
-                  <a:lnTo>
-                    <a:pt x="0" y="2003"/>
-                  </a:lnTo>
-                  <a:lnTo>
-                    <a:pt x="25" y="2149"/>
-                  </a:lnTo>
-                  <a:lnTo>
-                    <a:pt x="73" y="2296"/>
-                  </a:lnTo>
-                  <a:lnTo>
-                    <a:pt x="122" y="2394"/>
-                  </a:lnTo>
-                  <a:lnTo>
-                    <a:pt x="269" y="2613"/>
-                  </a:lnTo>
-                  <a:lnTo>
-                    <a:pt x="391" y="2784"/>
-                  </a:lnTo>
-                  <a:lnTo>
-                    <a:pt x="513" y="2907"/>
-                  </a:lnTo>
-                  <a:lnTo>
-                    <a:pt x="586" y="3029"/>
-                  </a:lnTo>
-                  <a:lnTo>
-                    <a:pt x="660" y="3175"/>
-                  </a:lnTo>
-                  <a:lnTo>
-                    <a:pt x="660" y="3346"/>
-                  </a:lnTo>
-                  <a:lnTo>
-                    <a:pt x="660" y="3542"/>
-                  </a:lnTo>
-                  <a:lnTo>
-                    <a:pt x="586" y="3688"/>
-                  </a:lnTo>
-                  <a:lnTo>
-                    <a:pt x="513" y="3810"/>
-                  </a:lnTo>
-                  <a:lnTo>
-                    <a:pt x="391" y="3932"/>
-                  </a:lnTo>
-                  <a:lnTo>
-                    <a:pt x="269" y="4103"/>
-                  </a:lnTo>
-                  <a:lnTo>
-                    <a:pt x="122" y="4299"/>
-                  </a:lnTo>
-                  <a:lnTo>
-                    <a:pt x="73" y="4421"/>
-                  </a:lnTo>
-                  <a:lnTo>
-                    <a:pt x="25" y="4567"/>
-                  </a:lnTo>
-                  <a:lnTo>
-                    <a:pt x="0" y="4714"/>
-                  </a:lnTo>
-                  <a:lnTo>
-                    <a:pt x="0" y="4885"/>
-                  </a:lnTo>
-                  <a:lnTo>
-                    <a:pt x="25" y="5007"/>
-                  </a:lnTo>
-                  <a:lnTo>
-                    <a:pt x="73" y="5080"/>
-                  </a:lnTo>
-                  <a:lnTo>
-                    <a:pt x="171" y="5153"/>
-                  </a:lnTo>
-                  <a:lnTo>
-                    <a:pt x="269" y="5178"/>
-                  </a:lnTo>
-                  <a:lnTo>
-                    <a:pt x="391" y="5153"/>
-                  </a:lnTo>
-                  <a:lnTo>
-                    <a:pt x="464" y="5080"/>
-                  </a:lnTo>
-                  <a:lnTo>
-                    <a:pt x="538" y="5007"/>
-                  </a:lnTo>
-                  <a:lnTo>
-                    <a:pt x="562" y="4885"/>
-                  </a:lnTo>
-                  <a:lnTo>
-                    <a:pt x="586" y="4714"/>
-                  </a:lnTo>
-                  <a:lnTo>
-                    <a:pt x="635" y="4567"/>
-                  </a:lnTo>
-                  <a:lnTo>
-                    <a:pt x="708" y="4445"/>
-                  </a:lnTo>
-                  <a:lnTo>
-                    <a:pt x="831" y="4299"/>
-                  </a:lnTo>
-                  <a:lnTo>
-                    <a:pt x="953" y="4152"/>
-                  </a:lnTo>
-                  <a:lnTo>
-                    <a:pt x="1099" y="3932"/>
-                  </a:lnTo>
-                  <a:lnTo>
-                    <a:pt x="1148" y="3810"/>
-                  </a:lnTo>
-                  <a:lnTo>
-                    <a:pt x="1197" y="3688"/>
-                  </a:lnTo>
-                  <a:lnTo>
-                    <a:pt x="1221" y="3542"/>
-                  </a:lnTo>
-                  <a:lnTo>
-                    <a:pt x="1221" y="3346"/>
-                  </a:lnTo>
-                  <a:lnTo>
-                    <a:pt x="1221" y="3175"/>
-                  </a:lnTo>
-                  <a:lnTo>
-                    <a:pt x="1197" y="3029"/>
-                  </a:lnTo>
-                  <a:lnTo>
-                    <a:pt x="1148" y="2882"/>
-                  </a:lnTo>
-                  <a:lnTo>
-                    <a:pt x="1099" y="2784"/>
-                  </a:lnTo>
-                  <a:lnTo>
-                    <a:pt x="953" y="2565"/>
-                  </a:lnTo>
-                  <a:lnTo>
-                    <a:pt x="831" y="2394"/>
-                  </a:lnTo>
-                  <a:lnTo>
-                    <a:pt x="708" y="2272"/>
-                  </a:lnTo>
-                  <a:lnTo>
-                    <a:pt x="635" y="2149"/>
-                  </a:lnTo>
-                  <a:lnTo>
-                    <a:pt x="586" y="2003"/>
-                  </a:lnTo>
-                  <a:lnTo>
-                    <a:pt x="562" y="1832"/>
-                  </a:lnTo>
-                  <a:lnTo>
-                    <a:pt x="586" y="1637"/>
-                  </a:lnTo>
-                  <a:lnTo>
-                    <a:pt x="635" y="1490"/>
-                  </a:lnTo>
-                  <a:lnTo>
-                    <a:pt x="708" y="1368"/>
-                  </a:lnTo>
-                  <a:lnTo>
-                    <a:pt x="831" y="1246"/>
-                  </a:lnTo>
-                  <a:lnTo>
-                    <a:pt x="953" y="1075"/>
-                  </a:lnTo>
-                  <a:lnTo>
-                    <a:pt x="1099" y="879"/>
-                  </a:lnTo>
-                  <a:lnTo>
-                    <a:pt x="1148" y="757"/>
-                  </a:lnTo>
-                  <a:lnTo>
-                    <a:pt x="1197" y="611"/>
-                  </a:lnTo>
-                  <a:lnTo>
-                    <a:pt x="1221" y="464"/>
-                  </a:lnTo>
-                  <a:lnTo>
-                    <a:pt x="1221" y="293"/>
-                  </a:lnTo>
-                  <a:lnTo>
-                    <a:pt x="1221" y="171"/>
-                  </a:lnTo>
-                  <a:lnTo>
-                    <a:pt x="1148" y="98"/>
-                  </a:lnTo>
-                  <a:lnTo>
-                    <a:pt x="1050" y="25"/>
-                  </a:lnTo>
-                  <a:lnTo>
-                    <a:pt x="953" y="0"/>
-                  </a:lnTo>
-                  <a:close/>
-                </a:path>
-              </a:pathLst>
-            </a:custGeom>
-            <a:solidFill>
-              <a:srgbClr val="FFB600"/>
-            </a:solidFill>
-            <a:ln>
-              <a:noFill/>
-            </a:ln>
-          </p:spPr>
-          <p:txBody>
-            <a:bodyPr spcFirstLastPara="1" wrap="square" lIns="91425" tIns="91425" rIns="91425" bIns="91425" anchor="ctr" anchorCtr="0">
-              <a:noAutofit/>
-            </a:bodyPr>
-            <a:lstStyle/>
-            <a:p>
-              <a:pPr marL="0" lvl="0" indent="0" algn="l" rtl="0">
-                <a:spcBef>
-                  <a:spcPts val="0"/>
-                </a:spcBef>
-                <a:spcAft>
-                  <a:spcPts val="0"/>
-                </a:spcAft>
-                <a:buNone/>
-              </a:pPr>
-              <a:endParaRPr/>
-            </a:p>
-          </p:txBody>
-        </p:sp>
-      </p:grpSp>
-      <p:sp>
-        <p:nvSpPr>
-          <p:cNvPr id="12" name="TextBox 11"/>
-          <p:cNvSpPr txBox="1"/>
-          <p:nvPr/>
-        </p:nvSpPr>
-        <p:spPr>
-          <a:xfrm>
-            <a:off x="1676400" y="616375"/>
-            <a:ext cx="5105400" cy="461665"/>
-          </a:xfrm>
-          <a:prstGeom prst="rect">
-            <a:avLst/>
-          </a:prstGeom>
-          <a:noFill/>
-        </p:spPr>
-        <p:txBody>
-          <a:bodyPr wrap="square" rtlCol="0">
-            <a:spAutoFit/>
-          </a:bodyPr>
-          <a:lstStyle/>
-          <a:p>
-            <a:r>
-              <a:rPr lang="en-US" sz="2400" dirty="0"/>
-              <a:t>2.2 </a:t>
-            </a:r>
-            <a:r>
-              <a:rPr lang="en-US" sz="2400" dirty="0" err="1"/>
-              <a:t>Thiết</a:t>
-            </a:r>
-            <a:r>
-              <a:rPr lang="en-US" sz="2400" dirty="0"/>
-              <a:t> </a:t>
-            </a:r>
-            <a:r>
-              <a:rPr lang="en-US" sz="2400" dirty="0" err="1"/>
-              <a:t>kế</a:t>
-            </a:r>
-            <a:r>
-              <a:rPr lang="en-US" sz="2400" dirty="0"/>
-              <a:t> </a:t>
-            </a:r>
-            <a:r>
-              <a:rPr lang="en-US" sz="2400" dirty="0" err="1"/>
-              <a:t>cơ</a:t>
-            </a:r>
-            <a:r>
-              <a:rPr lang="en-US" sz="2400" dirty="0"/>
-              <a:t> </a:t>
-            </a:r>
-            <a:r>
-              <a:rPr lang="en-US" sz="2400" dirty="0" err="1"/>
-              <a:t>sở</a:t>
-            </a:r>
-            <a:r>
-              <a:rPr lang="en-US" sz="2400" dirty="0"/>
-              <a:t> </a:t>
-            </a:r>
-            <a:r>
-              <a:rPr lang="en-US" sz="2400" dirty="0" err="1"/>
-              <a:t>dữ</a:t>
-            </a:r>
-            <a:r>
-              <a:rPr lang="en-US" sz="2400" dirty="0"/>
-              <a:t> </a:t>
-            </a:r>
-            <a:r>
-              <a:rPr lang="en-US" sz="2400" dirty="0" err="1"/>
-              <a:t>liệu</a:t>
-            </a:r>
-            <a:endParaRPr lang="en-US" sz="2400" dirty="0"/>
-          </a:p>
-        </p:txBody>
-      </p:sp>
-      <p:pic>
-        <p:nvPicPr>
-          <p:cNvPr id="3" name="Picture 2">
-            <a:extLst>
-              <a:ext uri="{FF2B5EF4-FFF2-40B4-BE49-F238E27FC236}">
-                <a16:creationId xmlns:a16="http://schemas.microsoft.com/office/drawing/2014/main" id="{4FD2CF34-EE42-4CAE-99E1-AEA8CB947B5B}"/>
-              </a:ext>
-            </a:extLst>
-          </p:cNvPr>
-          <p:cNvPicPr>
-            <a:picLocks noChangeAspect="1"/>
-          </p:cNvPicPr>
-          <p:nvPr/>
-        </p:nvPicPr>
-        <p:blipFill>
-          <a:blip r:embed="rId3">
-            <a:extLst>
-              <a:ext uri="{28A0092B-C50C-407E-A947-70E740481C1C}">
-                <a14:useLocalDpi xmlns:a14="http://schemas.microsoft.com/office/drawing/2010/main" val="0"/>
-              </a:ext>
-            </a:extLst>
-          </a:blip>
-          <a:stretch>
-            <a:fillRect/>
-          </a:stretch>
-        </p:blipFill>
-        <p:spPr>
-          <a:xfrm>
-            <a:off x="1066800" y="1332465"/>
-            <a:ext cx="6946033" cy="3201113"/>
+            <a:off x="1219200" y="754036"/>
+            <a:ext cx="3615926" cy="430887"/>
           </a:xfrm>
           <a:prstGeom prst="rect">
             <a:avLst/>
           </a:prstGeom>
         </p:spPr>
-      </p:pic>
+        <p:txBody>
+          <a:bodyPr wrap="none">
+            <a:spAutoFit/>
+          </a:bodyPr>
+          <a:lstStyle/>
+          <a:p>
+            <a:r>
+              <a:rPr lang="en-US" sz="2200" dirty="0"/>
+              <a:t>2.1 </a:t>
+            </a:r>
+            <a:r>
+              <a:rPr lang="en-US" sz="2200" dirty="0" err="1"/>
+              <a:t>Sơ</a:t>
+            </a:r>
+            <a:r>
+              <a:rPr lang="en-US" sz="2200" dirty="0"/>
+              <a:t> </a:t>
+            </a:r>
+            <a:r>
+              <a:rPr lang="en-US" sz="2200" dirty="0" err="1"/>
+              <a:t>đồ</a:t>
+            </a:r>
+            <a:r>
+              <a:rPr lang="en-US" sz="2200" dirty="0"/>
+              <a:t> </a:t>
+            </a:r>
+            <a:r>
+              <a:rPr lang="en-US" sz="2200" dirty="0" err="1"/>
+              <a:t>phân</a:t>
+            </a:r>
+            <a:r>
+              <a:rPr lang="en-US" sz="2200" dirty="0"/>
+              <a:t> </a:t>
+            </a:r>
+            <a:r>
+              <a:rPr lang="en-US" sz="2200" dirty="0" err="1"/>
+              <a:t>cấp</a:t>
+            </a:r>
+            <a:r>
+              <a:rPr lang="en-US" sz="2200" dirty="0"/>
+              <a:t> </a:t>
+            </a:r>
+            <a:r>
+              <a:rPr lang="en-US" sz="2200" dirty="0" err="1"/>
+              <a:t>chức</a:t>
+            </a:r>
+            <a:r>
+              <a:rPr lang="en-US" sz="2200" dirty="0"/>
+              <a:t> </a:t>
+            </a:r>
+            <a:r>
+              <a:rPr lang="en-US" sz="2200" dirty="0" err="1"/>
+              <a:t>năng</a:t>
+            </a:r>
+            <a:endParaRPr lang="en-US" sz="2200" dirty="0"/>
+          </a:p>
+        </p:txBody>
+      </p:sp>
+      <p:sp>
+        <p:nvSpPr>
+          <p:cNvPr id="8" name="Rectangle 7"/>
+          <p:cNvSpPr/>
+          <p:nvPr/>
+        </p:nvSpPr>
+        <p:spPr>
+          <a:xfrm>
+            <a:off x="1114942" y="284394"/>
+            <a:ext cx="7391400" cy="461665"/>
+          </a:xfrm>
+          <a:prstGeom prst="rect">
+            <a:avLst/>
+          </a:prstGeom>
+        </p:spPr>
+        <p:txBody>
+          <a:bodyPr wrap="square">
+            <a:spAutoFit/>
+          </a:bodyPr>
+          <a:lstStyle/>
+          <a:p>
+            <a:r>
+              <a:rPr lang="vi-VN" sz="2400" b="1" dirty="0"/>
+              <a:t>2.</a:t>
+            </a:r>
+            <a:r>
+              <a:rPr lang="en-US" sz="2400" b="1" dirty="0"/>
+              <a:t> </a:t>
+            </a:r>
+            <a:r>
+              <a:rPr lang="vi-VN" sz="2400" b="1" dirty="0"/>
+              <a:t>Phân tích quy trình và chức năng</a:t>
+            </a:r>
+            <a:r>
+              <a:rPr lang="en-US" sz="2400" b="1" dirty="0"/>
+              <a:t>.</a:t>
+            </a:r>
+          </a:p>
+        </p:txBody>
+      </p:sp>
+      <p:graphicFrame>
+        <p:nvGraphicFramePr>
+          <p:cNvPr id="9" name="Diagram 8"/>
+          <p:cNvGraphicFramePr/>
+          <p:nvPr>
+            <p:extLst>
+              <p:ext uri="{D42A27DB-BD31-4B8C-83A1-F6EECF244321}">
+                <p14:modId xmlns:p14="http://schemas.microsoft.com/office/powerpoint/2010/main" val="623983571"/>
+              </p:ext>
+            </p:extLst>
+          </p:nvPr>
+        </p:nvGraphicFramePr>
+        <p:xfrm>
+          <a:off x="533400" y="654947"/>
+          <a:ext cx="8077200" cy="4441804"/>
+        </p:xfrm>
+        <a:graphic>
+          <a:graphicData uri="http://schemas.openxmlformats.org/drawingml/2006/diagram">
+            <dgm:relIds xmlns:dgm="http://schemas.openxmlformats.org/drawingml/2006/diagram" xmlns:r="http://schemas.openxmlformats.org/officeDocument/2006/relationships" r:dm="rId2" r:lo="rId3" r:qs="rId4" r:cs="rId5"/>
+          </a:graphicData>
+        </a:graphic>
+      </p:graphicFrame>
     </p:spTree>
     <p:extLst>
       <p:ext uri="{BB962C8B-B14F-4D97-AF65-F5344CB8AC3E}">
-        <p14:creationId xmlns:p14="http://schemas.microsoft.com/office/powerpoint/2010/main" val="2624961967"/>
+        <p14:creationId xmlns:p14="http://schemas.microsoft.com/office/powerpoint/2010/main" val="2663527285"/>
       </p:ext>
     </p:extLst>
   </p:cSld>
   <p:clrMapOvr>
     <a:masterClrMapping/>
   </p:clrMapOvr>
+  <p:timing>
+    <p:tnLst>
+      <p:par>
+        <p:cTn id="1" dur="indefinite" restart="never" nodeType="tmRoot">
+          <p:childTnLst>
+            <p:seq concurrent="1" nextAc="seek">
+              <p:cTn id="2" dur="indefinite" nodeType="mainSeq">
+                <p:childTnLst>
+                  <p:par>
+                    <p:cTn id="3" fill="hold">
+                      <p:stCondLst>
+                        <p:cond delay="indefinite"/>
+                      </p:stCondLst>
+                      <p:childTnLst>
+                        <p:par>
+                          <p:cTn id="4" fill="hold">
+                            <p:stCondLst>
+                              <p:cond delay="0"/>
+                            </p:stCondLst>
+                            <p:childTnLst>
+                              <p:par>
+                                <p:cTn id="5" presetID="22" presetClass="entr" presetSubtype="1" fill="hold" grpId="0" nodeType="clickEffect">
+                                  <p:stCondLst>
+                                    <p:cond delay="0"/>
+                                  </p:stCondLst>
+                                  <p:childTnLst>
+                                    <p:set>
+                                      <p:cBhvr>
+                                        <p:cTn id="6" dur="1" fill="hold">
+                                          <p:stCondLst>
+                                            <p:cond delay="0"/>
+                                          </p:stCondLst>
+                                        </p:cTn>
+                                        <p:tgtEl>
+                                          <p:spTgt spid="9"/>
+                                        </p:tgtEl>
+                                        <p:attrNameLst>
+                                          <p:attrName>style.visibility</p:attrName>
+                                        </p:attrNameLst>
+                                      </p:cBhvr>
+                                      <p:to>
+                                        <p:strVal val="visible"/>
+                                      </p:to>
+                                    </p:set>
+                                    <p:animEffect transition="in" filter="wipe(up)">
+                                      <p:cBhvr>
+                                        <p:cTn id="7" dur="500"/>
+                                        <p:tgtEl>
+                                          <p:spTgt spid="9"/>
+                                        </p:tgtEl>
+                                      </p:cBhvr>
+                                    </p:animEffect>
+                                  </p:childTnLst>
+                                </p:cTn>
+                              </p:par>
+                            </p:childTnLst>
+                          </p:cTn>
+                        </p:par>
+                      </p:childTnLst>
+                    </p:cTn>
+                  </p:par>
+                </p:childTnLst>
+              </p:cTn>
+              <p:prevCondLst>
+                <p:cond evt="onPrev" delay="0">
+                  <p:tgtEl>
+                    <p:sldTgt/>
+                  </p:tgtEl>
+                </p:cond>
+              </p:prevCondLst>
+              <p:nextCondLst>
+                <p:cond evt="onNext" delay="0">
+                  <p:tgtEl>
+                    <p:sldTgt/>
+                  </p:tgtEl>
+                </p:cond>
+              </p:nextCondLst>
+            </p:seq>
+          </p:childTnLst>
+        </p:cTn>
+      </p:par>
+    </p:tnLst>
+    <p:bldLst>
+      <p:bldGraphic spid="9" grpId="0">
+        <p:bldAsOne/>
+      </p:bldGraphic>
+    </p:bldLst>
+  </p:timing>
 </p:sld>
 </file>
 
@@ -33810,6 +32468,1602 @@
         </p:nvSpPr>
         <p:spPr>
           <a:xfrm>
+            <a:off x="1676400" y="616375"/>
+            <a:ext cx="5105400" cy="461665"/>
+          </a:xfrm>
+          <a:prstGeom prst="rect">
+            <a:avLst/>
+          </a:prstGeom>
+          <a:noFill/>
+        </p:spPr>
+        <p:txBody>
+          <a:bodyPr wrap="square" rtlCol="0">
+            <a:spAutoFit/>
+          </a:bodyPr>
+          <a:lstStyle/>
+          <a:p>
+            <a:r>
+              <a:rPr lang="en-US" sz="2400" dirty="0"/>
+              <a:t>2.2 </a:t>
+            </a:r>
+            <a:r>
+              <a:rPr lang="en-US" sz="2400" dirty="0" err="1"/>
+              <a:t>Thiết</a:t>
+            </a:r>
+            <a:r>
+              <a:rPr lang="en-US" sz="2400" dirty="0"/>
+              <a:t> </a:t>
+            </a:r>
+            <a:r>
+              <a:rPr lang="en-US" sz="2400" dirty="0" err="1"/>
+              <a:t>kế</a:t>
+            </a:r>
+            <a:r>
+              <a:rPr lang="en-US" sz="2400" dirty="0"/>
+              <a:t> </a:t>
+            </a:r>
+            <a:r>
+              <a:rPr lang="en-US" sz="2400" dirty="0" err="1"/>
+              <a:t>cơ</a:t>
+            </a:r>
+            <a:r>
+              <a:rPr lang="en-US" sz="2400" dirty="0"/>
+              <a:t> </a:t>
+            </a:r>
+            <a:r>
+              <a:rPr lang="en-US" sz="2400" dirty="0" err="1"/>
+              <a:t>sở</a:t>
+            </a:r>
+            <a:r>
+              <a:rPr lang="en-US" sz="2400" dirty="0"/>
+              <a:t> </a:t>
+            </a:r>
+            <a:r>
+              <a:rPr lang="en-US" sz="2400" dirty="0" err="1"/>
+              <a:t>dữ</a:t>
+            </a:r>
+            <a:r>
+              <a:rPr lang="en-US" sz="2400" dirty="0"/>
+              <a:t> </a:t>
+            </a:r>
+            <a:r>
+              <a:rPr lang="en-US" sz="2400" dirty="0" err="1"/>
+              <a:t>liệu</a:t>
+            </a:r>
+            <a:endParaRPr lang="en-US" sz="2400" dirty="0"/>
+          </a:p>
+        </p:txBody>
+      </p:sp>
+      <p:pic>
+        <p:nvPicPr>
+          <p:cNvPr id="3" name="Picture 2">
+            <a:extLst>
+              <a:ext uri="{FF2B5EF4-FFF2-40B4-BE49-F238E27FC236}">
+                <a16:creationId xmlns:a16="http://schemas.microsoft.com/office/drawing/2014/main" id="{4FD2CF34-EE42-4CAE-99E1-AEA8CB947B5B}"/>
+              </a:ext>
+            </a:extLst>
+          </p:cNvPr>
+          <p:cNvPicPr>
+            <a:picLocks noChangeAspect="1"/>
+          </p:cNvPicPr>
+          <p:nvPr/>
+        </p:nvPicPr>
+        <p:blipFill>
+          <a:blip r:embed="rId3">
+            <a:extLst>
+              <a:ext uri="{28A0092B-C50C-407E-A947-70E740481C1C}">
+                <a14:useLocalDpi xmlns:a14="http://schemas.microsoft.com/office/drawing/2010/main" val="0"/>
+              </a:ext>
+            </a:extLst>
+          </a:blip>
+          <a:stretch>
+            <a:fillRect/>
+          </a:stretch>
+        </p:blipFill>
+        <p:spPr>
+          <a:xfrm>
+            <a:off x="1066800" y="1332465"/>
+            <a:ext cx="6946033" cy="3201113"/>
+          </a:xfrm>
+          <a:prstGeom prst="rect">
+            <a:avLst/>
+          </a:prstGeom>
+        </p:spPr>
+      </p:pic>
+    </p:spTree>
+    <p:extLst>
+      <p:ext uri="{BB962C8B-B14F-4D97-AF65-F5344CB8AC3E}">
+        <p14:creationId xmlns:p14="http://schemas.microsoft.com/office/powerpoint/2010/main" val="2624961967"/>
+      </p:ext>
+    </p:extLst>
+  </p:cSld>
+  <p:clrMapOvr>
+    <a:masterClrMapping/>
+  </p:clrMapOvr>
+</p:sld>
+</file>
+
+<file path=ppt/slides/slide12.xml><?xml version="1.0" encoding="utf-8"?>
+<p:sld xmlns:a="http://schemas.openxmlformats.org/drawingml/2006/main" xmlns:r="http://schemas.openxmlformats.org/officeDocument/2006/relationships" xmlns:p="http://schemas.openxmlformats.org/presentationml/2006/main">
+  <p:cSld>
+    <p:spTree>
+      <p:nvGrpSpPr>
+        <p:cNvPr id="1" name=""/>
+        <p:cNvGrpSpPr/>
+        <p:nvPr/>
+      </p:nvGrpSpPr>
+      <p:grpSpPr>
+        <a:xfrm>
+          <a:off x="0" y="0"/>
+          <a:ext cx="0" cy="0"/>
+          <a:chOff x="0" y="0"/>
+          <a:chExt cx="0" cy="0"/>
+        </a:xfrm>
+      </p:grpSpPr>
+      <p:sp>
+        <p:nvSpPr>
+          <p:cNvPr id="4" name="Rounded Rectangle 3"/>
+          <p:cNvSpPr/>
+          <p:nvPr/>
+        </p:nvSpPr>
+        <p:spPr>
+          <a:xfrm>
+            <a:off x="457200" y="361950"/>
+            <a:ext cx="8229600" cy="4572000"/>
+          </a:xfrm>
+          <a:prstGeom prst="roundRect">
+            <a:avLst/>
+          </a:prstGeom>
+          <a:noFill/>
+          <a:ln w="19050">
+            <a:solidFill>
+              <a:srgbClr val="FFFF00"/>
+            </a:solidFill>
+            <a:prstDash val="dash"/>
+          </a:ln>
+        </p:spPr>
+        <p:style>
+          <a:lnRef idx="2">
+            <a:schemeClr val="accent1">
+              <a:shade val="50000"/>
+            </a:schemeClr>
+          </a:lnRef>
+          <a:fillRef idx="1">
+            <a:schemeClr val="accent1"/>
+          </a:fillRef>
+          <a:effectRef idx="0">
+            <a:schemeClr val="accent1"/>
+          </a:effectRef>
+          <a:fontRef idx="minor">
+            <a:schemeClr val="lt1"/>
+          </a:fontRef>
+        </p:style>
+        <p:txBody>
+          <a:bodyPr rtlCol="0" anchor="ctr"/>
+          <a:lstStyle/>
+          <a:p>
+            <a:pPr algn="ctr"/>
+            <a:endParaRPr lang="en-US"/>
+          </a:p>
+        </p:txBody>
+      </p:sp>
+      <p:pic>
+        <p:nvPicPr>
+          <p:cNvPr id="5" name="Picture 12" descr="HÃ¬nh áº£nh cÃ³ liÃªn quan"/>
+          <p:cNvPicPr>
+            <a:picLocks noChangeAspect="1" noChangeArrowheads="1"/>
+          </p:cNvPicPr>
+          <p:nvPr/>
+        </p:nvPicPr>
+        <p:blipFill>
+          <a:blip r:embed="rId2" cstate="print">
+            <a:extLst>
+              <a:ext uri="{28A0092B-C50C-407E-A947-70E740481C1C}">
+                <a14:useLocalDpi xmlns:a14="http://schemas.microsoft.com/office/drawing/2010/main" val="0"/>
+              </a:ext>
+            </a:extLst>
+          </a:blip>
+          <a:srcRect/>
+          <a:stretch>
+            <a:fillRect/>
+          </a:stretch>
+        </p:blipFill>
+        <p:spPr bwMode="auto">
+          <a:xfrm>
+            <a:off x="7727385" y="3714750"/>
+            <a:ext cx="1109238" cy="1109238"/>
+          </a:xfrm>
+          <a:prstGeom prst="rect">
+            <a:avLst/>
+          </a:prstGeom>
+          <a:ln>
+            <a:noFill/>
+          </a:ln>
+          <a:effectLst>
+            <a:outerShdw blurRad="292100" dist="139700" dir="2700000" algn="tl" rotWithShape="0">
+              <a:srgbClr val="333333">
+                <a:alpha val="65000"/>
+              </a:srgbClr>
+            </a:outerShdw>
+          </a:effectLst>
+          <a:extLst>
+            <a:ext uri="{909E8E84-426E-40DD-AFC4-6F175D3DCCD1}">
+              <a14:hiddenFill xmlns:a14="http://schemas.microsoft.com/office/drawing/2010/main">
+                <a:solidFill>
+                  <a:srgbClr val="FFFFFF"/>
+                </a:solidFill>
+              </a14:hiddenFill>
+            </a:ext>
+          </a:extLst>
+        </p:spPr>
+      </p:pic>
+      <p:grpSp>
+        <p:nvGrpSpPr>
+          <p:cNvPr id="6" name="Google Shape;622;p38"/>
+          <p:cNvGrpSpPr/>
+          <p:nvPr/>
+        </p:nvGrpSpPr>
+        <p:grpSpPr>
+          <a:xfrm>
+            <a:off x="8012833" y="145908"/>
+            <a:ext cx="697289" cy="685800"/>
+            <a:chOff x="1244325" y="4999400"/>
+            <a:chExt cx="444525" cy="437200"/>
+          </a:xfrm>
+        </p:grpSpPr>
+        <p:sp>
+          <p:nvSpPr>
+            <p:cNvPr id="7" name="Google Shape;623;p38"/>
+            <p:cNvSpPr/>
+            <p:nvPr/>
+          </p:nvSpPr>
+          <p:spPr>
+            <a:xfrm>
+              <a:off x="1244325" y="5161200"/>
+              <a:ext cx="374925" cy="222275"/>
+            </a:xfrm>
+            <a:custGeom>
+              <a:avLst/>
+              <a:gdLst/>
+              <a:ahLst/>
+              <a:cxnLst/>
+              <a:rect l="l" t="t" r="r" b="b"/>
+              <a:pathLst>
+                <a:path w="14997" h="8891" extrusionOk="0">
+                  <a:moveTo>
+                    <a:pt x="2077" y="1661"/>
+                  </a:moveTo>
+                  <a:lnTo>
+                    <a:pt x="2199" y="1685"/>
+                  </a:lnTo>
+                  <a:lnTo>
+                    <a:pt x="2468" y="1783"/>
+                  </a:lnTo>
+                  <a:lnTo>
+                    <a:pt x="2687" y="1930"/>
+                  </a:lnTo>
+                  <a:lnTo>
+                    <a:pt x="2883" y="2076"/>
+                  </a:lnTo>
+                  <a:lnTo>
+                    <a:pt x="2932" y="2443"/>
+                  </a:lnTo>
+                  <a:lnTo>
+                    <a:pt x="3005" y="2833"/>
+                  </a:lnTo>
+                  <a:lnTo>
+                    <a:pt x="3176" y="3664"/>
+                  </a:lnTo>
+                  <a:lnTo>
+                    <a:pt x="3396" y="4470"/>
+                  </a:lnTo>
+                  <a:lnTo>
+                    <a:pt x="3567" y="5154"/>
+                  </a:lnTo>
+                  <a:lnTo>
+                    <a:pt x="3371" y="5105"/>
+                  </a:lnTo>
+                  <a:lnTo>
+                    <a:pt x="3152" y="5031"/>
+                  </a:lnTo>
+                  <a:lnTo>
+                    <a:pt x="2956" y="4934"/>
+                  </a:lnTo>
+                  <a:lnTo>
+                    <a:pt x="2736" y="4812"/>
+                  </a:lnTo>
+                  <a:lnTo>
+                    <a:pt x="2541" y="4690"/>
+                  </a:lnTo>
+                  <a:lnTo>
+                    <a:pt x="2321" y="4543"/>
+                  </a:lnTo>
+                  <a:lnTo>
+                    <a:pt x="2126" y="4372"/>
+                  </a:lnTo>
+                  <a:lnTo>
+                    <a:pt x="1930" y="4201"/>
+                  </a:lnTo>
+                  <a:lnTo>
+                    <a:pt x="1759" y="4006"/>
+                  </a:lnTo>
+                  <a:lnTo>
+                    <a:pt x="1613" y="3810"/>
+                  </a:lnTo>
+                  <a:lnTo>
+                    <a:pt x="1466" y="3590"/>
+                  </a:lnTo>
+                  <a:lnTo>
+                    <a:pt x="1344" y="3395"/>
+                  </a:lnTo>
+                  <a:lnTo>
+                    <a:pt x="1247" y="3175"/>
+                  </a:lnTo>
+                  <a:lnTo>
+                    <a:pt x="1173" y="2931"/>
+                  </a:lnTo>
+                  <a:lnTo>
+                    <a:pt x="1124" y="2711"/>
+                  </a:lnTo>
+                  <a:lnTo>
+                    <a:pt x="1124" y="2491"/>
+                  </a:lnTo>
+                  <a:lnTo>
+                    <a:pt x="1124" y="2320"/>
+                  </a:lnTo>
+                  <a:lnTo>
+                    <a:pt x="1173" y="2174"/>
+                  </a:lnTo>
+                  <a:lnTo>
+                    <a:pt x="1247" y="2027"/>
+                  </a:lnTo>
+                  <a:lnTo>
+                    <a:pt x="1369" y="1905"/>
+                  </a:lnTo>
+                  <a:lnTo>
+                    <a:pt x="1491" y="1808"/>
+                  </a:lnTo>
+                  <a:lnTo>
+                    <a:pt x="1613" y="1734"/>
+                  </a:lnTo>
+                  <a:lnTo>
+                    <a:pt x="1784" y="1685"/>
+                  </a:lnTo>
+                  <a:lnTo>
+                    <a:pt x="1955" y="1661"/>
+                  </a:lnTo>
+                  <a:close/>
+                  <a:moveTo>
+                    <a:pt x="3225" y="0"/>
+                  </a:moveTo>
+                  <a:lnTo>
+                    <a:pt x="3127" y="25"/>
+                  </a:lnTo>
+                  <a:lnTo>
+                    <a:pt x="3029" y="98"/>
+                  </a:lnTo>
+                  <a:lnTo>
+                    <a:pt x="2932" y="147"/>
+                  </a:lnTo>
+                  <a:lnTo>
+                    <a:pt x="2883" y="245"/>
+                  </a:lnTo>
+                  <a:lnTo>
+                    <a:pt x="2834" y="342"/>
+                  </a:lnTo>
+                  <a:lnTo>
+                    <a:pt x="2785" y="440"/>
+                  </a:lnTo>
+                  <a:lnTo>
+                    <a:pt x="2785" y="538"/>
+                  </a:lnTo>
+                  <a:lnTo>
+                    <a:pt x="2785" y="709"/>
+                  </a:lnTo>
+                  <a:lnTo>
+                    <a:pt x="2565" y="635"/>
+                  </a:lnTo>
+                  <a:lnTo>
+                    <a:pt x="2370" y="586"/>
+                  </a:lnTo>
+                  <a:lnTo>
+                    <a:pt x="2150" y="562"/>
+                  </a:lnTo>
+                  <a:lnTo>
+                    <a:pt x="1955" y="538"/>
+                  </a:lnTo>
+                  <a:lnTo>
+                    <a:pt x="1759" y="562"/>
+                  </a:lnTo>
+                  <a:lnTo>
+                    <a:pt x="1564" y="586"/>
+                  </a:lnTo>
+                  <a:lnTo>
+                    <a:pt x="1369" y="635"/>
+                  </a:lnTo>
+                  <a:lnTo>
+                    <a:pt x="1198" y="709"/>
+                  </a:lnTo>
+                  <a:lnTo>
+                    <a:pt x="1027" y="782"/>
+                  </a:lnTo>
+                  <a:lnTo>
+                    <a:pt x="856" y="880"/>
+                  </a:lnTo>
+                  <a:lnTo>
+                    <a:pt x="709" y="1002"/>
+                  </a:lnTo>
+                  <a:lnTo>
+                    <a:pt x="563" y="1124"/>
+                  </a:lnTo>
+                  <a:lnTo>
+                    <a:pt x="441" y="1246"/>
+                  </a:lnTo>
+                  <a:lnTo>
+                    <a:pt x="343" y="1417"/>
+                  </a:lnTo>
+                  <a:lnTo>
+                    <a:pt x="245" y="1563"/>
+                  </a:lnTo>
+                  <a:lnTo>
+                    <a:pt x="147" y="1734"/>
+                  </a:lnTo>
+                  <a:lnTo>
+                    <a:pt x="99" y="1905"/>
+                  </a:lnTo>
+                  <a:lnTo>
+                    <a:pt x="50" y="2101"/>
+                  </a:lnTo>
+                  <a:lnTo>
+                    <a:pt x="1" y="2296"/>
+                  </a:lnTo>
+                  <a:lnTo>
+                    <a:pt x="1" y="2491"/>
+                  </a:lnTo>
+                  <a:lnTo>
+                    <a:pt x="25" y="2858"/>
+                  </a:lnTo>
+                  <a:lnTo>
+                    <a:pt x="99" y="3200"/>
+                  </a:lnTo>
+                  <a:lnTo>
+                    <a:pt x="221" y="3566"/>
+                  </a:lnTo>
+                  <a:lnTo>
+                    <a:pt x="367" y="3884"/>
+                  </a:lnTo>
+                  <a:lnTo>
+                    <a:pt x="563" y="4225"/>
+                  </a:lnTo>
+                  <a:lnTo>
+                    <a:pt x="782" y="4543"/>
+                  </a:lnTo>
+                  <a:lnTo>
+                    <a:pt x="1027" y="4836"/>
+                  </a:lnTo>
+                  <a:lnTo>
+                    <a:pt x="1295" y="5105"/>
+                  </a:lnTo>
+                  <a:lnTo>
+                    <a:pt x="1588" y="5349"/>
+                  </a:lnTo>
+                  <a:lnTo>
+                    <a:pt x="1906" y="5593"/>
+                  </a:lnTo>
+                  <a:lnTo>
+                    <a:pt x="2248" y="5789"/>
+                  </a:lnTo>
+                  <a:lnTo>
+                    <a:pt x="2590" y="5960"/>
+                  </a:lnTo>
+                  <a:lnTo>
+                    <a:pt x="2932" y="6106"/>
+                  </a:lnTo>
+                  <a:lnTo>
+                    <a:pt x="3274" y="6204"/>
+                  </a:lnTo>
+                  <a:lnTo>
+                    <a:pt x="3616" y="6277"/>
+                  </a:lnTo>
+                  <a:lnTo>
+                    <a:pt x="3957" y="6301"/>
+                  </a:lnTo>
+                  <a:lnTo>
+                    <a:pt x="4080" y="6643"/>
+                  </a:lnTo>
+                  <a:lnTo>
+                    <a:pt x="4226" y="6961"/>
+                  </a:lnTo>
+                  <a:lnTo>
+                    <a:pt x="4519" y="7596"/>
+                  </a:lnTo>
+                  <a:lnTo>
+                    <a:pt x="4812" y="8133"/>
+                  </a:lnTo>
+                  <a:lnTo>
+                    <a:pt x="5081" y="8597"/>
+                  </a:lnTo>
+                  <a:lnTo>
+                    <a:pt x="5154" y="8719"/>
+                  </a:lnTo>
+                  <a:lnTo>
+                    <a:pt x="5276" y="8817"/>
+                  </a:lnTo>
+                  <a:lnTo>
+                    <a:pt x="5423" y="8866"/>
+                  </a:lnTo>
+                  <a:lnTo>
+                    <a:pt x="5569" y="8890"/>
+                  </a:lnTo>
+                  <a:lnTo>
+                    <a:pt x="12212" y="8890"/>
+                  </a:lnTo>
+                  <a:lnTo>
+                    <a:pt x="12359" y="8866"/>
+                  </a:lnTo>
+                  <a:lnTo>
+                    <a:pt x="12506" y="8817"/>
+                  </a:lnTo>
+                  <a:lnTo>
+                    <a:pt x="12628" y="8719"/>
+                  </a:lnTo>
+                  <a:lnTo>
+                    <a:pt x="12701" y="8597"/>
+                  </a:lnTo>
+                  <a:lnTo>
+                    <a:pt x="12994" y="8060"/>
+                  </a:lnTo>
+                  <a:lnTo>
+                    <a:pt x="13360" y="7352"/>
+                  </a:lnTo>
+                  <a:lnTo>
+                    <a:pt x="13727" y="6472"/>
+                  </a:lnTo>
+                  <a:lnTo>
+                    <a:pt x="13922" y="6008"/>
+                  </a:lnTo>
+                  <a:lnTo>
+                    <a:pt x="14117" y="5495"/>
+                  </a:lnTo>
+                  <a:lnTo>
+                    <a:pt x="14288" y="4958"/>
+                  </a:lnTo>
+                  <a:lnTo>
+                    <a:pt x="14459" y="4372"/>
+                  </a:lnTo>
+                  <a:lnTo>
+                    <a:pt x="14606" y="3786"/>
+                  </a:lnTo>
+                  <a:lnTo>
+                    <a:pt x="14752" y="3175"/>
+                  </a:lnTo>
+                  <a:lnTo>
+                    <a:pt x="14850" y="2540"/>
+                  </a:lnTo>
+                  <a:lnTo>
+                    <a:pt x="14923" y="1881"/>
+                  </a:lnTo>
+                  <a:lnTo>
+                    <a:pt x="14972" y="1221"/>
+                  </a:lnTo>
+                  <a:lnTo>
+                    <a:pt x="14997" y="538"/>
+                  </a:lnTo>
+                  <a:lnTo>
+                    <a:pt x="14997" y="440"/>
+                  </a:lnTo>
+                  <a:lnTo>
+                    <a:pt x="14948" y="342"/>
+                  </a:lnTo>
+                  <a:lnTo>
+                    <a:pt x="14899" y="245"/>
+                  </a:lnTo>
+                  <a:lnTo>
+                    <a:pt x="14850" y="147"/>
+                  </a:lnTo>
+                  <a:lnTo>
+                    <a:pt x="14752" y="98"/>
+                  </a:lnTo>
+                  <a:lnTo>
+                    <a:pt x="14655" y="25"/>
+                  </a:lnTo>
+                  <a:lnTo>
+                    <a:pt x="14557" y="0"/>
+                  </a:lnTo>
+                  <a:close/>
+                </a:path>
+              </a:pathLst>
+            </a:custGeom>
+            <a:solidFill>
+              <a:srgbClr val="FFB600"/>
+            </a:solidFill>
+            <a:ln>
+              <a:noFill/>
+            </a:ln>
+          </p:spPr>
+          <p:txBody>
+            <a:bodyPr spcFirstLastPara="1" wrap="square" lIns="91425" tIns="91425" rIns="91425" bIns="91425" anchor="ctr" anchorCtr="0">
+              <a:noAutofit/>
+            </a:bodyPr>
+            <a:lstStyle/>
+            <a:p>
+              <a:pPr marL="0" lvl="0" indent="0" algn="l" rtl="0">
+                <a:spcBef>
+                  <a:spcPts val="0"/>
+                </a:spcBef>
+                <a:spcAft>
+                  <a:spcPts val="0"/>
+                </a:spcAft>
+                <a:buNone/>
+              </a:pPr>
+              <a:endParaRPr/>
+            </a:p>
+          </p:txBody>
+        </p:sp>
+        <p:sp>
+          <p:nvSpPr>
+            <p:cNvPr id="8" name="Google Shape;624;p38"/>
+            <p:cNvSpPr/>
+            <p:nvPr/>
+          </p:nvSpPr>
+          <p:spPr>
+            <a:xfrm>
+              <a:off x="1244325" y="5397500"/>
+              <a:ext cx="444525" cy="39100"/>
+            </a:xfrm>
+            <a:custGeom>
+              <a:avLst/>
+              <a:gdLst/>
+              <a:ahLst/>
+              <a:cxnLst/>
+              <a:rect l="l" t="t" r="r" b="b"/>
+              <a:pathLst>
+                <a:path w="17781" h="1564" extrusionOk="0">
+                  <a:moveTo>
+                    <a:pt x="1" y="0"/>
+                  </a:moveTo>
+                  <a:lnTo>
+                    <a:pt x="25" y="244"/>
+                  </a:lnTo>
+                  <a:lnTo>
+                    <a:pt x="99" y="488"/>
+                  </a:lnTo>
+                  <a:lnTo>
+                    <a:pt x="196" y="757"/>
+                  </a:lnTo>
+                  <a:lnTo>
+                    <a:pt x="318" y="1001"/>
+                  </a:lnTo>
+                  <a:lnTo>
+                    <a:pt x="489" y="1221"/>
+                  </a:lnTo>
+                  <a:lnTo>
+                    <a:pt x="685" y="1392"/>
+                  </a:lnTo>
+                  <a:lnTo>
+                    <a:pt x="782" y="1465"/>
+                  </a:lnTo>
+                  <a:lnTo>
+                    <a:pt x="880" y="1514"/>
+                  </a:lnTo>
+                  <a:lnTo>
+                    <a:pt x="1002" y="1539"/>
+                  </a:lnTo>
+                  <a:lnTo>
+                    <a:pt x="1124" y="1563"/>
+                  </a:lnTo>
+                  <a:lnTo>
+                    <a:pt x="16657" y="1563"/>
+                  </a:lnTo>
+                  <a:lnTo>
+                    <a:pt x="16780" y="1539"/>
+                  </a:lnTo>
+                  <a:lnTo>
+                    <a:pt x="16902" y="1514"/>
+                  </a:lnTo>
+                  <a:lnTo>
+                    <a:pt x="16999" y="1465"/>
+                  </a:lnTo>
+                  <a:lnTo>
+                    <a:pt x="17097" y="1392"/>
+                  </a:lnTo>
+                  <a:lnTo>
+                    <a:pt x="17292" y="1221"/>
+                  </a:lnTo>
+                  <a:lnTo>
+                    <a:pt x="17463" y="1001"/>
+                  </a:lnTo>
+                  <a:lnTo>
+                    <a:pt x="17586" y="757"/>
+                  </a:lnTo>
+                  <a:lnTo>
+                    <a:pt x="17683" y="488"/>
+                  </a:lnTo>
+                  <a:lnTo>
+                    <a:pt x="17756" y="244"/>
+                  </a:lnTo>
+                  <a:lnTo>
+                    <a:pt x="17781" y="0"/>
+                  </a:lnTo>
+                  <a:close/>
+                </a:path>
+              </a:pathLst>
+            </a:custGeom>
+            <a:solidFill>
+              <a:srgbClr val="FFB600"/>
+            </a:solidFill>
+            <a:ln>
+              <a:noFill/>
+            </a:ln>
+          </p:spPr>
+          <p:txBody>
+            <a:bodyPr spcFirstLastPara="1" wrap="square" lIns="91425" tIns="91425" rIns="91425" bIns="91425" anchor="ctr" anchorCtr="0">
+              <a:noAutofit/>
+            </a:bodyPr>
+            <a:lstStyle/>
+            <a:p>
+              <a:pPr marL="0" lvl="0" indent="0" algn="l" rtl="0">
+                <a:spcBef>
+                  <a:spcPts val="0"/>
+                </a:spcBef>
+                <a:spcAft>
+                  <a:spcPts val="0"/>
+                </a:spcAft>
+                <a:buNone/>
+              </a:pPr>
+              <a:endParaRPr/>
+            </a:p>
+          </p:txBody>
+        </p:sp>
+        <p:sp>
+          <p:nvSpPr>
+            <p:cNvPr id="9" name="Google Shape;625;p38"/>
+            <p:cNvSpPr/>
+            <p:nvPr/>
+          </p:nvSpPr>
+          <p:spPr>
+            <a:xfrm>
+              <a:off x="1451925" y="4999400"/>
+              <a:ext cx="31175" cy="129450"/>
+            </a:xfrm>
+            <a:custGeom>
+              <a:avLst/>
+              <a:gdLst/>
+              <a:ahLst/>
+              <a:cxnLst/>
+              <a:rect l="l" t="t" r="r" b="b"/>
+              <a:pathLst>
+                <a:path w="1247" h="5178" extrusionOk="0">
+                  <a:moveTo>
+                    <a:pt x="953" y="0"/>
+                  </a:moveTo>
+                  <a:lnTo>
+                    <a:pt x="856" y="25"/>
+                  </a:lnTo>
+                  <a:lnTo>
+                    <a:pt x="758" y="98"/>
+                  </a:lnTo>
+                  <a:lnTo>
+                    <a:pt x="709" y="171"/>
+                  </a:lnTo>
+                  <a:lnTo>
+                    <a:pt x="685" y="293"/>
+                  </a:lnTo>
+                  <a:lnTo>
+                    <a:pt x="660" y="464"/>
+                  </a:lnTo>
+                  <a:lnTo>
+                    <a:pt x="611" y="611"/>
+                  </a:lnTo>
+                  <a:lnTo>
+                    <a:pt x="514" y="733"/>
+                  </a:lnTo>
+                  <a:lnTo>
+                    <a:pt x="416" y="879"/>
+                  </a:lnTo>
+                  <a:lnTo>
+                    <a:pt x="269" y="1026"/>
+                  </a:lnTo>
+                  <a:lnTo>
+                    <a:pt x="147" y="1246"/>
+                  </a:lnTo>
+                  <a:lnTo>
+                    <a:pt x="74" y="1368"/>
+                  </a:lnTo>
+                  <a:lnTo>
+                    <a:pt x="50" y="1490"/>
+                  </a:lnTo>
+                  <a:lnTo>
+                    <a:pt x="1" y="1661"/>
+                  </a:lnTo>
+                  <a:lnTo>
+                    <a:pt x="1" y="1832"/>
+                  </a:lnTo>
+                  <a:lnTo>
+                    <a:pt x="1" y="2003"/>
+                  </a:lnTo>
+                  <a:lnTo>
+                    <a:pt x="50" y="2149"/>
+                  </a:lnTo>
+                  <a:lnTo>
+                    <a:pt x="74" y="2296"/>
+                  </a:lnTo>
+                  <a:lnTo>
+                    <a:pt x="147" y="2394"/>
+                  </a:lnTo>
+                  <a:lnTo>
+                    <a:pt x="269" y="2613"/>
+                  </a:lnTo>
+                  <a:lnTo>
+                    <a:pt x="416" y="2784"/>
+                  </a:lnTo>
+                  <a:lnTo>
+                    <a:pt x="514" y="2907"/>
+                  </a:lnTo>
+                  <a:lnTo>
+                    <a:pt x="611" y="3029"/>
+                  </a:lnTo>
+                  <a:lnTo>
+                    <a:pt x="660" y="3175"/>
+                  </a:lnTo>
+                  <a:lnTo>
+                    <a:pt x="685" y="3346"/>
+                  </a:lnTo>
+                  <a:lnTo>
+                    <a:pt x="660" y="3542"/>
+                  </a:lnTo>
+                  <a:lnTo>
+                    <a:pt x="611" y="3688"/>
+                  </a:lnTo>
+                  <a:lnTo>
+                    <a:pt x="514" y="3810"/>
+                  </a:lnTo>
+                  <a:lnTo>
+                    <a:pt x="416" y="3932"/>
+                  </a:lnTo>
+                  <a:lnTo>
+                    <a:pt x="269" y="4103"/>
+                  </a:lnTo>
+                  <a:lnTo>
+                    <a:pt x="147" y="4299"/>
+                  </a:lnTo>
+                  <a:lnTo>
+                    <a:pt x="74" y="4421"/>
+                  </a:lnTo>
+                  <a:lnTo>
+                    <a:pt x="50" y="4567"/>
+                  </a:lnTo>
+                  <a:lnTo>
+                    <a:pt x="1" y="4714"/>
+                  </a:lnTo>
+                  <a:lnTo>
+                    <a:pt x="1" y="4885"/>
+                  </a:lnTo>
+                  <a:lnTo>
+                    <a:pt x="25" y="5007"/>
+                  </a:lnTo>
+                  <a:lnTo>
+                    <a:pt x="74" y="5080"/>
+                  </a:lnTo>
+                  <a:lnTo>
+                    <a:pt x="172" y="5153"/>
+                  </a:lnTo>
+                  <a:lnTo>
+                    <a:pt x="294" y="5178"/>
+                  </a:lnTo>
+                  <a:lnTo>
+                    <a:pt x="392" y="5153"/>
+                  </a:lnTo>
+                  <a:lnTo>
+                    <a:pt x="489" y="5080"/>
+                  </a:lnTo>
+                  <a:lnTo>
+                    <a:pt x="538" y="5007"/>
+                  </a:lnTo>
+                  <a:lnTo>
+                    <a:pt x="563" y="4885"/>
+                  </a:lnTo>
+                  <a:lnTo>
+                    <a:pt x="587" y="4714"/>
+                  </a:lnTo>
+                  <a:lnTo>
+                    <a:pt x="636" y="4567"/>
+                  </a:lnTo>
+                  <a:lnTo>
+                    <a:pt x="733" y="4445"/>
+                  </a:lnTo>
+                  <a:lnTo>
+                    <a:pt x="831" y="4299"/>
+                  </a:lnTo>
+                  <a:lnTo>
+                    <a:pt x="978" y="4152"/>
+                  </a:lnTo>
+                  <a:lnTo>
+                    <a:pt x="1100" y="3932"/>
+                  </a:lnTo>
+                  <a:lnTo>
+                    <a:pt x="1149" y="3810"/>
+                  </a:lnTo>
+                  <a:lnTo>
+                    <a:pt x="1197" y="3688"/>
+                  </a:lnTo>
+                  <a:lnTo>
+                    <a:pt x="1222" y="3542"/>
+                  </a:lnTo>
+                  <a:lnTo>
+                    <a:pt x="1246" y="3346"/>
+                  </a:lnTo>
+                  <a:lnTo>
+                    <a:pt x="1222" y="3175"/>
+                  </a:lnTo>
+                  <a:lnTo>
+                    <a:pt x="1197" y="3029"/>
+                  </a:lnTo>
+                  <a:lnTo>
+                    <a:pt x="1149" y="2882"/>
+                  </a:lnTo>
+                  <a:lnTo>
+                    <a:pt x="1100" y="2784"/>
+                  </a:lnTo>
+                  <a:lnTo>
+                    <a:pt x="978" y="2565"/>
+                  </a:lnTo>
+                  <a:lnTo>
+                    <a:pt x="831" y="2394"/>
+                  </a:lnTo>
+                  <a:lnTo>
+                    <a:pt x="733" y="2272"/>
+                  </a:lnTo>
+                  <a:lnTo>
+                    <a:pt x="636" y="2149"/>
+                  </a:lnTo>
+                  <a:lnTo>
+                    <a:pt x="587" y="2003"/>
+                  </a:lnTo>
+                  <a:lnTo>
+                    <a:pt x="563" y="1832"/>
+                  </a:lnTo>
+                  <a:lnTo>
+                    <a:pt x="587" y="1637"/>
+                  </a:lnTo>
+                  <a:lnTo>
+                    <a:pt x="636" y="1490"/>
+                  </a:lnTo>
+                  <a:lnTo>
+                    <a:pt x="733" y="1368"/>
+                  </a:lnTo>
+                  <a:lnTo>
+                    <a:pt x="831" y="1246"/>
+                  </a:lnTo>
+                  <a:lnTo>
+                    <a:pt x="978" y="1075"/>
+                  </a:lnTo>
+                  <a:lnTo>
+                    <a:pt x="1100" y="879"/>
+                  </a:lnTo>
+                  <a:lnTo>
+                    <a:pt x="1149" y="757"/>
+                  </a:lnTo>
+                  <a:lnTo>
+                    <a:pt x="1197" y="611"/>
+                  </a:lnTo>
+                  <a:lnTo>
+                    <a:pt x="1222" y="464"/>
+                  </a:lnTo>
+                  <a:lnTo>
+                    <a:pt x="1246" y="293"/>
+                  </a:lnTo>
+                  <a:lnTo>
+                    <a:pt x="1222" y="171"/>
+                  </a:lnTo>
+                  <a:lnTo>
+                    <a:pt x="1149" y="98"/>
+                  </a:lnTo>
+                  <a:lnTo>
+                    <a:pt x="1075" y="25"/>
+                  </a:lnTo>
+                  <a:lnTo>
+                    <a:pt x="953" y="0"/>
+                  </a:lnTo>
+                  <a:close/>
+                </a:path>
+              </a:pathLst>
+            </a:custGeom>
+            <a:solidFill>
+              <a:srgbClr val="FFB600"/>
+            </a:solidFill>
+            <a:ln>
+              <a:noFill/>
+            </a:ln>
+          </p:spPr>
+          <p:txBody>
+            <a:bodyPr spcFirstLastPara="1" wrap="square" lIns="91425" tIns="91425" rIns="91425" bIns="91425" anchor="ctr" anchorCtr="0">
+              <a:noAutofit/>
+            </a:bodyPr>
+            <a:lstStyle/>
+            <a:p>
+              <a:pPr marL="0" lvl="0" indent="0" algn="l" rtl="0">
+                <a:spcBef>
+                  <a:spcPts val="0"/>
+                </a:spcBef>
+                <a:spcAft>
+                  <a:spcPts val="0"/>
+                </a:spcAft>
+                <a:buNone/>
+              </a:pPr>
+              <a:endParaRPr/>
+            </a:p>
+          </p:txBody>
+        </p:sp>
+        <p:sp>
+          <p:nvSpPr>
+            <p:cNvPr id="10" name="Google Shape;626;p38"/>
+            <p:cNvSpPr/>
+            <p:nvPr/>
+          </p:nvSpPr>
+          <p:spPr>
+            <a:xfrm>
+              <a:off x="1407975" y="4999400"/>
+              <a:ext cx="31150" cy="129450"/>
+            </a:xfrm>
+            <a:custGeom>
+              <a:avLst/>
+              <a:gdLst/>
+              <a:ahLst/>
+              <a:cxnLst/>
+              <a:rect l="l" t="t" r="r" b="b"/>
+              <a:pathLst>
+                <a:path w="1246" h="5178" extrusionOk="0">
+                  <a:moveTo>
+                    <a:pt x="977" y="0"/>
+                  </a:moveTo>
+                  <a:lnTo>
+                    <a:pt x="855" y="25"/>
+                  </a:lnTo>
+                  <a:lnTo>
+                    <a:pt x="782" y="98"/>
+                  </a:lnTo>
+                  <a:lnTo>
+                    <a:pt x="709" y="171"/>
+                  </a:lnTo>
+                  <a:lnTo>
+                    <a:pt x="684" y="293"/>
+                  </a:lnTo>
+                  <a:lnTo>
+                    <a:pt x="660" y="464"/>
+                  </a:lnTo>
+                  <a:lnTo>
+                    <a:pt x="611" y="611"/>
+                  </a:lnTo>
+                  <a:lnTo>
+                    <a:pt x="538" y="733"/>
+                  </a:lnTo>
+                  <a:lnTo>
+                    <a:pt x="416" y="879"/>
+                  </a:lnTo>
+                  <a:lnTo>
+                    <a:pt x="269" y="1026"/>
+                  </a:lnTo>
+                  <a:lnTo>
+                    <a:pt x="147" y="1246"/>
+                  </a:lnTo>
+                  <a:lnTo>
+                    <a:pt x="98" y="1368"/>
+                  </a:lnTo>
+                  <a:lnTo>
+                    <a:pt x="49" y="1490"/>
+                  </a:lnTo>
+                  <a:lnTo>
+                    <a:pt x="25" y="1661"/>
+                  </a:lnTo>
+                  <a:lnTo>
+                    <a:pt x="0" y="1832"/>
+                  </a:lnTo>
+                  <a:lnTo>
+                    <a:pt x="25" y="2003"/>
+                  </a:lnTo>
+                  <a:lnTo>
+                    <a:pt x="49" y="2149"/>
+                  </a:lnTo>
+                  <a:lnTo>
+                    <a:pt x="98" y="2296"/>
+                  </a:lnTo>
+                  <a:lnTo>
+                    <a:pt x="147" y="2394"/>
+                  </a:lnTo>
+                  <a:lnTo>
+                    <a:pt x="269" y="2613"/>
+                  </a:lnTo>
+                  <a:lnTo>
+                    <a:pt x="416" y="2784"/>
+                  </a:lnTo>
+                  <a:lnTo>
+                    <a:pt x="538" y="2907"/>
+                  </a:lnTo>
+                  <a:lnTo>
+                    <a:pt x="611" y="3029"/>
+                  </a:lnTo>
+                  <a:lnTo>
+                    <a:pt x="660" y="3175"/>
+                  </a:lnTo>
+                  <a:lnTo>
+                    <a:pt x="684" y="3346"/>
+                  </a:lnTo>
+                  <a:lnTo>
+                    <a:pt x="660" y="3542"/>
+                  </a:lnTo>
+                  <a:lnTo>
+                    <a:pt x="611" y="3688"/>
+                  </a:lnTo>
+                  <a:lnTo>
+                    <a:pt x="538" y="3810"/>
+                  </a:lnTo>
+                  <a:lnTo>
+                    <a:pt x="416" y="3932"/>
+                  </a:lnTo>
+                  <a:lnTo>
+                    <a:pt x="269" y="4103"/>
+                  </a:lnTo>
+                  <a:lnTo>
+                    <a:pt x="147" y="4299"/>
+                  </a:lnTo>
+                  <a:lnTo>
+                    <a:pt x="98" y="4421"/>
+                  </a:lnTo>
+                  <a:lnTo>
+                    <a:pt x="49" y="4567"/>
+                  </a:lnTo>
+                  <a:lnTo>
+                    <a:pt x="25" y="4714"/>
+                  </a:lnTo>
+                  <a:lnTo>
+                    <a:pt x="0" y="4885"/>
+                  </a:lnTo>
+                  <a:lnTo>
+                    <a:pt x="25" y="5007"/>
+                  </a:lnTo>
+                  <a:lnTo>
+                    <a:pt x="98" y="5080"/>
+                  </a:lnTo>
+                  <a:lnTo>
+                    <a:pt x="171" y="5153"/>
+                  </a:lnTo>
+                  <a:lnTo>
+                    <a:pt x="293" y="5178"/>
+                  </a:lnTo>
+                  <a:lnTo>
+                    <a:pt x="391" y="5153"/>
+                  </a:lnTo>
+                  <a:lnTo>
+                    <a:pt x="489" y="5080"/>
+                  </a:lnTo>
+                  <a:lnTo>
+                    <a:pt x="562" y="5007"/>
+                  </a:lnTo>
+                  <a:lnTo>
+                    <a:pt x="586" y="4885"/>
+                  </a:lnTo>
+                  <a:lnTo>
+                    <a:pt x="586" y="4714"/>
+                  </a:lnTo>
+                  <a:lnTo>
+                    <a:pt x="660" y="4567"/>
+                  </a:lnTo>
+                  <a:lnTo>
+                    <a:pt x="733" y="4445"/>
+                  </a:lnTo>
+                  <a:lnTo>
+                    <a:pt x="831" y="4299"/>
+                  </a:lnTo>
+                  <a:lnTo>
+                    <a:pt x="977" y="4152"/>
+                  </a:lnTo>
+                  <a:lnTo>
+                    <a:pt x="1124" y="3932"/>
+                  </a:lnTo>
+                  <a:lnTo>
+                    <a:pt x="1173" y="3810"/>
+                  </a:lnTo>
+                  <a:lnTo>
+                    <a:pt x="1221" y="3688"/>
+                  </a:lnTo>
+                  <a:lnTo>
+                    <a:pt x="1246" y="3542"/>
+                  </a:lnTo>
+                  <a:lnTo>
+                    <a:pt x="1246" y="3346"/>
+                  </a:lnTo>
+                  <a:lnTo>
+                    <a:pt x="1246" y="3175"/>
+                  </a:lnTo>
+                  <a:lnTo>
+                    <a:pt x="1221" y="3029"/>
+                  </a:lnTo>
+                  <a:lnTo>
+                    <a:pt x="1173" y="2882"/>
+                  </a:lnTo>
+                  <a:lnTo>
+                    <a:pt x="1124" y="2784"/>
+                  </a:lnTo>
+                  <a:lnTo>
+                    <a:pt x="977" y="2565"/>
+                  </a:lnTo>
+                  <a:lnTo>
+                    <a:pt x="831" y="2394"/>
+                  </a:lnTo>
+                  <a:lnTo>
+                    <a:pt x="733" y="2272"/>
+                  </a:lnTo>
+                  <a:lnTo>
+                    <a:pt x="660" y="2149"/>
+                  </a:lnTo>
+                  <a:lnTo>
+                    <a:pt x="586" y="2003"/>
+                  </a:lnTo>
+                  <a:lnTo>
+                    <a:pt x="586" y="1832"/>
+                  </a:lnTo>
+                  <a:lnTo>
+                    <a:pt x="586" y="1637"/>
+                  </a:lnTo>
+                  <a:lnTo>
+                    <a:pt x="660" y="1490"/>
+                  </a:lnTo>
+                  <a:lnTo>
+                    <a:pt x="733" y="1368"/>
+                  </a:lnTo>
+                  <a:lnTo>
+                    <a:pt x="831" y="1246"/>
+                  </a:lnTo>
+                  <a:lnTo>
+                    <a:pt x="977" y="1075"/>
+                  </a:lnTo>
+                  <a:lnTo>
+                    <a:pt x="1124" y="879"/>
+                  </a:lnTo>
+                  <a:lnTo>
+                    <a:pt x="1173" y="757"/>
+                  </a:lnTo>
+                  <a:lnTo>
+                    <a:pt x="1221" y="611"/>
+                  </a:lnTo>
+                  <a:lnTo>
+                    <a:pt x="1246" y="464"/>
+                  </a:lnTo>
+                  <a:lnTo>
+                    <a:pt x="1246" y="293"/>
+                  </a:lnTo>
+                  <a:lnTo>
+                    <a:pt x="1221" y="171"/>
+                  </a:lnTo>
+                  <a:lnTo>
+                    <a:pt x="1173" y="98"/>
+                  </a:lnTo>
+                  <a:lnTo>
+                    <a:pt x="1075" y="25"/>
+                  </a:lnTo>
+                  <a:lnTo>
+                    <a:pt x="977" y="0"/>
+                  </a:lnTo>
+                  <a:close/>
+                </a:path>
+              </a:pathLst>
+            </a:custGeom>
+            <a:solidFill>
+              <a:srgbClr val="FFB600"/>
+            </a:solidFill>
+            <a:ln>
+              <a:noFill/>
+            </a:ln>
+          </p:spPr>
+          <p:txBody>
+            <a:bodyPr spcFirstLastPara="1" wrap="square" lIns="91425" tIns="91425" rIns="91425" bIns="91425" anchor="ctr" anchorCtr="0">
+              <a:noAutofit/>
+            </a:bodyPr>
+            <a:lstStyle/>
+            <a:p>
+              <a:pPr marL="0" lvl="0" indent="0" algn="l" rtl="0">
+                <a:spcBef>
+                  <a:spcPts val="0"/>
+                </a:spcBef>
+                <a:spcAft>
+                  <a:spcPts val="0"/>
+                </a:spcAft>
+                <a:buNone/>
+              </a:pPr>
+              <a:endParaRPr/>
+            </a:p>
+          </p:txBody>
+        </p:sp>
+        <p:sp>
+          <p:nvSpPr>
+            <p:cNvPr id="11" name="Google Shape;627;p38"/>
+            <p:cNvSpPr/>
+            <p:nvPr/>
+          </p:nvSpPr>
+          <p:spPr>
+            <a:xfrm>
+              <a:off x="1495900" y="4999400"/>
+              <a:ext cx="30550" cy="129450"/>
+            </a:xfrm>
+            <a:custGeom>
+              <a:avLst/>
+              <a:gdLst/>
+              <a:ahLst/>
+              <a:cxnLst/>
+              <a:rect l="l" t="t" r="r" b="b"/>
+              <a:pathLst>
+                <a:path w="1222" h="5178" extrusionOk="0">
+                  <a:moveTo>
+                    <a:pt x="953" y="0"/>
+                  </a:moveTo>
+                  <a:lnTo>
+                    <a:pt x="831" y="25"/>
+                  </a:lnTo>
+                  <a:lnTo>
+                    <a:pt x="757" y="98"/>
+                  </a:lnTo>
+                  <a:lnTo>
+                    <a:pt x="684" y="171"/>
+                  </a:lnTo>
+                  <a:lnTo>
+                    <a:pt x="660" y="293"/>
+                  </a:lnTo>
+                  <a:lnTo>
+                    <a:pt x="660" y="464"/>
+                  </a:lnTo>
+                  <a:lnTo>
+                    <a:pt x="586" y="611"/>
+                  </a:lnTo>
+                  <a:lnTo>
+                    <a:pt x="513" y="733"/>
+                  </a:lnTo>
+                  <a:lnTo>
+                    <a:pt x="391" y="879"/>
+                  </a:lnTo>
+                  <a:lnTo>
+                    <a:pt x="269" y="1026"/>
+                  </a:lnTo>
+                  <a:lnTo>
+                    <a:pt x="122" y="1246"/>
+                  </a:lnTo>
+                  <a:lnTo>
+                    <a:pt x="73" y="1368"/>
+                  </a:lnTo>
+                  <a:lnTo>
+                    <a:pt x="25" y="1490"/>
+                  </a:lnTo>
+                  <a:lnTo>
+                    <a:pt x="0" y="1661"/>
+                  </a:lnTo>
+                  <a:lnTo>
+                    <a:pt x="0" y="1832"/>
+                  </a:lnTo>
+                  <a:lnTo>
+                    <a:pt x="0" y="2003"/>
+                  </a:lnTo>
+                  <a:lnTo>
+                    <a:pt x="25" y="2149"/>
+                  </a:lnTo>
+                  <a:lnTo>
+                    <a:pt x="73" y="2296"/>
+                  </a:lnTo>
+                  <a:lnTo>
+                    <a:pt x="122" y="2394"/>
+                  </a:lnTo>
+                  <a:lnTo>
+                    <a:pt x="269" y="2613"/>
+                  </a:lnTo>
+                  <a:lnTo>
+                    <a:pt x="391" y="2784"/>
+                  </a:lnTo>
+                  <a:lnTo>
+                    <a:pt x="513" y="2907"/>
+                  </a:lnTo>
+                  <a:lnTo>
+                    <a:pt x="586" y="3029"/>
+                  </a:lnTo>
+                  <a:lnTo>
+                    <a:pt x="660" y="3175"/>
+                  </a:lnTo>
+                  <a:lnTo>
+                    <a:pt x="660" y="3346"/>
+                  </a:lnTo>
+                  <a:lnTo>
+                    <a:pt x="660" y="3542"/>
+                  </a:lnTo>
+                  <a:lnTo>
+                    <a:pt x="586" y="3688"/>
+                  </a:lnTo>
+                  <a:lnTo>
+                    <a:pt x="513" y="3810"/>
+                  </a:lnTo>
+                  <a:lnTo>
+                    <a:pt x="391" y="3932"/>
+                  </a:lnTo>
+                  <a:lnTo>
+                    <a:pt x="269" y="4103"/>
+                  </a:lnTo>
+                  <a:lnTo>
+                    <a:pt x="122" y="4299"/>
+                  </a:lnTo>
+                  <a:lnTo>
+                    <a:pt x="73" y="4421"/>
+                  </a:lnTo>
+                  <a:lnTo>
+                    <a:pt x="25" y="4567"/>
+                  </a:lnTo>
+                  <a:lnTo>
+                    <a:pt x="0" y="4714"/>
+                  </a:lnTo>
+                  <a:lnTo>
+                    <a:pt x="0" y="4885"/>
+                  </a:lnTo>
+                  <a:lnTo>
+                    <a:pt x="25" y="5007"/>
+                  </a:lnTo>
+                  <a:lnTo>
+                    <a:pt x="73" y="5080"/>
+                  </a:lnTo>
+                  <a:lnTo>
+                    <a:pt x="171" y="5153"/>
+                  </a:lnTo>
+                  <a:lnTo>
+                    <a:pt x="269" y="5178"/>
+                  </a:lnTo>
+                  <a:lnTo>
+                    <a:pt x="391" y="5153"/>
+                  </a:lnTo>
+                  <a:lnTo>
+                    <a:pt x="464" y="5080"/>
+                  </a:lnTo>
+                  <a:lnTo>
+                    <a:pt x="538" y="5007"/>
+                  </a:lnTo>
+                  <a:lnTo>
+                    <a:pt x="562" y="4885"/>
+                  </a:lnTo>
+                  <a:lnTo>
+                    <a:pt x="586" y="4714"/>
+                  </a:lnTo>
+                  <a:lnTo>
+                    <a:pt x="635" y="4567"/>
+                  </a:lnTo>
+                  <a:lnTo>
+                    <a:pt x="708" y="4445"/>
+                  </a:lnTo>
+                  <a:lnTo>
+                    <a:pt x="831" y="4299"/>
+                  </a:lnTo>
+                  <a:lnTo>
+                    <a:pt x="953" y="4152"/>
+                  </a:lnTo>
+                  <a:lnTo>
+                    <a:pt x="1099" y="3932"/>
+                  </a:lnTo>
+                  <a:lnTo>
+                    <a:pt x="1148" y="3810"/>
+                  </a:lnTo>
+                  <a:lnTo>
+                    <a:pt x="1197" y="3688"/>
+                  </a:lnTo>
+                  <a:lnTo>
+                    <a:pt x="1221" y="3542"/>
+                  </a:lnTo>
+                  <a:lnTo>
+                    <a:pt x="1221" y="3346"/>
+                  </a:lnTo>
+                  <a:lnTo>
+                    <a:pt x="1221" y="3175"/>
+                  </a:lnTo>
+                  <a:lnTo>
+                    <a:pt x="1197" y="3029"/>
+                  </a:lnTo>
+                  <a:lnTo>
+                    <a:pt x="1148" y="2882"/>
+                  </a:lnTo>
+                  <a:lnTo>
+                    <a:pt x="1099" y="2784"/>
+                  </a:lnTo>
+                  <a:lnTo>
+                    <a:pt x="953" y="2565"/>
+                  </a:lnTo>
+                  <a:lnTo>
+                    <a:pt x="831" y="2394"/>
+                  </a:lnTo>
+                  <a:lnTo>
+                    <a:pt x="708" y="2272"/>
+                  </a:lnTo>
+                  <a:lnTo>
+                    <a:pt x="635" y="2149"/>
+                  </a:lnTo>
+                  <a:lnTo>
+                    <a:pt x="586" y="2003"/>
+                  </a:lnTo>
+                  <a:lnTo>
+                    <a:pt x="562" y="1832"/>
+                  </a:lnTo>
+                  <a:lnTo>
+                    <a:pt x="586" y="1637"/>
+                  </a:lnTo>
+                  <a:lnTo>
+                    <a:pt x="635" y="1490"/>
+                  </a:lnTo>
+                  <a:lnTo>
+                    <a:pt x="708" y="1368"/>
+                  </a:lnTo>
+                  <a:lnTo>
+                    <a:pt x="831" y="1246"/>
+                  </a:lnTo>
+                  <a:lnTo>
+                    <a:pt x="953" y="1075"/>
+                  </a:lnTo>
+                  <a:lnTo>
+                    <a:pt x="1099" y="879"/>
+                  </a:lnTo>
+                  <a:lnTo>
+                    <a:pt x="1148" y="757"/>
+                  </a:lnTo>
+                  <a:lnTo>
+                    <a:pt x="1197" y="611"/>
+                  </a:lnTo>
+                  <a:lnTo>
+                    <a:pt x="1221" y="464"/>
+                  </a:lnTo>
+                  <a:lnTo>
+                    <a:pt x="1221" y="293"/>
+                  </a:lnTo>
+                  <a:lnTo>
+                    <a:pt x="1221" y="171"/>
+                  </a:lnTo>
+                  <a:lnTo>
+                    <a:pt x="1148" y="98"/>
+                  </a:lnTo>
+                  <a:lnTo>
+                    <a:pt x="1050" y="25"/>
+                  </a:lnTo>
+                  <a:lnTo>
+                    <a:pt x="953" y="0"/>
+                  </a:lnTo>
+                  <a:close/>
+                </a:path>
+              </a:pathLst>
+            </a:custGeom>
+            <a:solidFill>
+              <a:srgbClr val="FFB600"/>
+            </a:solidFill>
+            <a:ln>
+              <a:noFill/>
+            </a:ln>
+          </p:spPr>
+          <p:txBody>
+            <a:bodyPr spcFirstLastPara="1" wrap="square" lIns="91425" tIns="91425" rIns="91425" bIns="91425" anchor="ctr" anchorCtr="0">
+              <a:noAutofit/>
+            </a:bodyPr>
+            <a:lstStyle/>
+            <a:p>
+              <a:pPr marL="0" lvl="0" indent="0" algn="l" rtl="0">
+                <a:spcBef>
+                  <a:spcPts val="0"/>
+                </a:spcBef>
+                <a:spcAft>
+                  <a:spcPts val="0"/>
+                </a:spcAft>
+                <a:buNone/>
+              </a:pPr>
+              <a:endParaRPr/>
+            </a:p>
+          </p:txBody>
+        </p:sp>
+      </p:grpSp>
+      <p:sp>
+        <p:nvSpPr>
+          <p:cNvPr id="12" name="TextBox 11"/>
+          <p:cNvSpPr txBox="1"/>
+          <p:nvPr/>
+        </p:nvSpPr>
+        <p:spPr>
+          <a:xfrm>
             <a:off x="990600" y="616375"/>
             <a:ext cx="5105400" cy="461665"/>
           </a:xfrm>
@@ -33879,7 +34133,7 @@
 </p:sld>
 </file>
 
-<file path=ppt/slides/slide12.xml><?xml version="1.0" encoding="utf-8"?>
+<file path=ppt/slides/slide13.xml><?xml version="1.0" encoding="utf-8"?>
 <p:sld xmlns:a="http://schemas.openxmlformats.org/drawingml/2006/main" xmlns:r="http://schemas.openxmlformats.org/officeDocument/2006/relationships" xmlns:p="http://schemas.openxmlformats.org/presentationml/2006/main">
   <p:cSld>
     <p:spTree>
@@ -33932,7 +34186,7 @@
             </a:pPr>
             <a:fld id="{00000000-1234-1234-1234-123412341234}" type="slidenum">
               <a:rPr lang="en"/>
-              <a:t>12</a:t>
+              <a:t>13</a:t>
             </a:fld>
             <a:endParaRPr/>
           </a:p>
@@ -34048,7 +34302,7 @@
 </p:sld>
 </file>
 
-<file path=ppt/slides/slide13.xml><?xml version="1.0" encoding="utf-8"?>
+<file path=ppt/slides/slide14.xml><?xml version="1.0" encoding="utf-8"?>
 <p:sld xmlns:a="http://schemas.openxmlformats.org/drawingml/2006/main" xmlns:r="http://schemas.openxmlformats.org/officeDocument/2006/relationships" xmlns:p="http://schemas.openxmlformats.org/presentationml/2006/main">
   <p:cSld>
     <p:spTree>
@@ -34078,7 +34332,7 @@
 </p:sld>
 </file>
 
-<file path=ppt/slides/slide14.xml><?xml version="1.0" encoding="utf-8"?>
+<file path=ppt/slides/slide15.xml><?xml version="1.0" encoding="utf-8"?>
 <p:sld xmlns:a="http://schemas.openxmlformats.org/drawingml/2006/main" xmlns:r="http://schemas.openxmlformats.org/officeDocument/2006/relationships" xmlns:p="http://schemas.openxmlformats.org/presentationml/2006/main">
   <p:cSld>
     <p:spTree>
@@ -34922,7 +35176,7 @@
 </p:sld>
 </file>
 
-<file path=ppt/slides/slide15.xml><?xml version="1.0" encoding="utf-8"?>
+<file path=ppt/slides/slide16.xml><?xml version="1.0" encoding="utf-8"?>
 <p:sld xmlns:a="http://schemas.openxmlformats.org/drawingml/2006/main" xmlns:r="http://schemas.openxmlformats.org/officeDocument/2006/relationships" xmlns:p="http://schemas.openxmlformats.org/presentationml/2006/main">
   <p:cSld>
     <p:spTree>
@@ -36524,6 +36778,160 @@
   <p:cSld>
     <p:spTree>
       <p:nvGrpSpPr>
+        <p:cNvPr id="1" name=""/>
+        <p:cNvGrpSpPr/>
+        <p:nvPr/>
+      </p:nvGrpSpPr>
+      <p:grpSpPr>
+        <a:xfrm>
+          <a:off x="0" y="0"/>
+          <a:ext cx="0" cy="0"/>
+          <a:chOff x="0" y="0"/>
+          <a:chExt cx="0" cy="0"/>
+        </a:xfrm>
+      </p:grpSpPr>
+      <p:sp>
+        <p:nvSpPr>
+          <p:cNvPr id="2" name="Title 1">
+            <a:extLst>
+              <a:ext uri="{FF2B5EF4-FFF2-40B4-BE49-F238E27FC236}">
+                <a16:creationId xmlns:a16="http://schemas.microsoft.com/office/drawing/2014/main" id="{4206C9D2-4FF2-4679-83FB-2B23D1BCC51A}"/>
+              </a:ext>
+            </a:extLst>
+          </p:cNvPr>
+          <p:cNvSpPr>
+            <a:spLocks noGrp="1"/>
+          </p:cNvSpPr>
+          <p:nvPr>
+            <p:ph type="title"/>
+          </p:nvPr>
+        </p:nvSpPr>
+        <p:spPr>
+          <a:xfrm>
+            <a:off x="838200" y="575252"/>
+            <a:ext cx="6866100" cy="857400"/>
+          </a:xfrm>
+        </p:spPr>
+        <p:txBody>
+          <a:bodyPr/>
+          <a:lstStyle/>
+          <a:p>
+            <a:r>
+              <a:rPr lang="en-US"/>
+              <a:t>Biểu đồ Grantt</a:t>
+            </a:r>
+          </a:p>
+        </p:txBody>
+      </p:sp>
+      <p:sp>
+        <p:nvSpPr>
+          <p:cNvPr id="3" name="Text Placeholder 2">
+            <a:extLst>
+              <a:ext uri="{FF2B5EF4-FFF2-40B4-BE49-F238E27FC236}">
+                <a16:creationId xmlns:a16="http://schemas.microsoft.com/office/drawing/2014/main" id="{EB16B2E6-4519-4232-8E36-874392AD1C65}"/>
+              </a:ext>
+            </a:extLst>
+          </p:cNvPr>
+          <p:cNvSpPr>
+            <a:spLocks noGrp="1"/>
+          </p:cNvSpPr>
+          <p:nvPr>
+            <p:ph type="body" idx="1"/>
+          </p:nvPr>
+        </p:nvSpPr>
+        <p:spPr/>
+        <p:txBody>
+          <a:bodyPr/>
+          <a:lstStyle/>
+          <a:p>
+            <a:endParaRPr lang="en-US"/>
+          </a:p>
+        </p:txBody>
+      </p:sp>
+      <p:sp>
+        <p:nvSpPr>
+          <p:cNvPr id="4" name="Slide Number Placeholder 3">
+            <a:extLst>
+              <a:ext uri="{FF2B5EF4-FFF2-40B4-BE49-F238E27FC236}">
+                <a16:creationId xmlns:a16="http://schemas.microsoft.com/office/drawing/2014/main" id="{6E99EF4A-78B1-48CA-AB81-6D78382F1D65}"/>
+              </a:ext>
+            </a:extLst>
+          </p:cNvPr>
+          <p:cNvSpPr>
+            <a:spLocks noGrp="1"/>
+          </p:cNvSpPr>
+          <p:nvPr>
+            <p:ph type="sldNum" idx="12"/>
+          </p:nvPr>
+        </p:nvSpPr>
+        <p:spPr/>
+        <p:txBody>
+          <a:bodyPr/>
+          <a:lstStyle/>
+          <a:p>
+            <a:fld id="{00000000-1234-1234-1234-123412341234}" type="slidenum">
+              <a:rPr lang="en" smtClean="0"/>
+              <a:pPr/>
+              <a:t>3</a:t>
+            </a:fld>
+            <a:endParaRPr lang="en"/>
+          </a:p>
+        </p:txBody>
+      </p:sp>
+      <p:pic>
+        <p:nvPicPr>
+          <p:cNvPr id="6" name="Picture 5">
+            <a:extLst>
+              <a:ext uri="{FF2B5EF4-FFF2-40B4-BE49-F238E27FC236}">
+                <a16:creationId xmlns:a16="http://schemas.microsoft.com/office/drawing/2014/main" id="{E171AFF2-3F73-489C-B3D2-F91EA25621F7}"/>
+              </a:ext>
+            </a:extLst>
+          </p:cNvPr>
+          <p:cNvPicPr>
+            <a:picLocks noChangeAspect="1"/>
+          </p:cNvPicPr>
+          <p:nvPr/>
+        </p:nvPicPr>
+        <p:blipFill>
+          <a:blip r:embed="rId2">
+            <a:extLst>
+              <a:ext uri="{28A0092B-C50C-407E-A947-70E740481C1C}">
+                <a14:useLocalDpi xmlns:a14="http://schemas.microsoft.com/office/drawing/2010/main" val="0"/>
+              </a:ext>
+            </a:extLst>
+          </a:blip>
+          <a:stretch>
+            <a:fillRect/>
+          </a:stretch>
+        </p:blipFill>
+        <p:spPr>
+          <a:xfrm>
+            <a:off x="457200" y="1885951"/>
+            <a:ext cx="7848600" cy="2819399"/>
+          </a:xfrm>
+          <a:prstGeom prst="rect">
+            <a:avLst/>
+          </a:prstGeom>
+        </p:spPr>
+      </p:pic>
+    </p:spTree>
+    <p:extLst>
+      <p:ext uri="{BB962C8B-B14F-4D97-AF65-F5344CB8AC3E}">
+        <p14:creationId xmlns:p14="http://schemas.microsoft.com/office/powerpoint/2010/main" val="169123952"/>
+      </p:ext>
+    </p:extLst>
+  </p:cSld>
+  <p:clrMapOvr>
+    <a:masterClrMapping/>
+  </p:clrMapOvr>
+</p:sld>
+</file>
+
+<file path=ppt/slides/slide4.xml><?xml version="1.0" encoding="utf-8"?>
+<p:sld xmlns:a="http://schemas.openxmlformats.org/drawingml/2006/main" xmlns:r="http://schemas.openxmlformats.org/officeDocument/2006/relationships" xmlns:p="http://schemas.openxmlformats.org/presentationml/2006/main">
+  <p:cSld>
+    <p:spTree>
+      <p:nvGrpSpPr>
         <p:cNvPr id="1" name="Shape 100"/>
         <p:cNvGrpSpPr/>
         <p:nvPr/>
@@ -36565,7 +36973,7 @@
             <a:fld id="{00000000-1234-1234-1234-123412341234}" type="slidenum">
               <a:rPr lang="en"/>
               <a:pPr algn="ctr"/>
-              <a:t>3</a:t>
+              <a:t>4</a:t>
             </a:fld>
             <a:endParaRPr/>
           </a:p>
@@ -36860,7 +37268,7 @@
 </p:sld>
 </file>
 
-<file path=ppt/slides/slide4.xml><?xml version="1.0" encoding="utf-8"?>
+<file path=ppt/slides/slide5.xml><?xml version="1.0" encoding="utf-8"?>
 <p:sld xmlns:a="http://schemas.openxmlformats.org/drawingml/2006/main" xmlns:r="http://schemas.openxmlformats.org/officeDocument/2006/relationships" xmlns:p="http://schemas.openxmlformats.org/presentationml/2006/main">
   <p:cSld>
     <p:spTree>
@@ -36905,7 +37313,7 @@
             <a:fld id="{00000000-1234-1234-1234-123412341234}" type="slidenum">
               <a:rPr lang="en"/>
               <a:pPr/>
-              <a:t>4</a:t>
+              <a:t>5</a:t>
             </a:fld>
             <a:endParaRPr/>
           </a:p>
@@ -38147,7 +38555,7 @@
 </p:sld>
 </file>
 
-<file path=ppt/slides/slide5.xml><?xml version="1.0" encoding="utf-8"?>
+<file path=ppt/slides/slide6.xml><?xml version="1.0" encoding="utf-8"?>
 <p:sld xmlns:a="http://schemas.openxmlformats.org/drawingml/2006/main" xmlns:r="http://schemas.openxmlformats.org/officeDocument/2006/relationships" xmlns:p="http://schemas.openxmlformats.org/presentationml/2006/main">
   <p:cSld>
     <p:spTree>
@@ -38193,7 +38601,7 @@
             <a:fld id="{00000000-1234-1234-1234-123412341234}" type="slidenum">
               <a:rPr lang="en"/>
               <a:pPr algn="ctr"/>
-              <a:t>5</a:t>
+              <a:t>6</a:t>
             </a:fld>
             <a:endParaRPr/>
           </a:p>
@@ -39128,7 +39536,7 @@
 </p:sld>
 </file>
 
-<file path=ppt/slides/slide6.xml><?xml version="1.0" encoding="utf-8"?>
+<file path=ppt/slides/slide7.xml><?xml version="1.0" encoding="utf-8"?>
 <p:sld xmlns:a="http://schemas.openxmlformats.org/drawingml/2006/main" xmlns:r="http://schemas.openxmlformats.org/officeDocument/2006/relationships" xmlns:p="http://schemas.openxmlformats.org/presentationml/2006/main">
   <p:cSld>
     <p:spTree>
@@ -40657,7 +41065,7 @@
 </p:sld>
 </file>
 
-<file path=ppt/slides/slide7.xml><?xml version="1.0" encoding="utf-8"?>
+<file path=ppt/slides/slide8.xml><?xml version="1.0" encoding="utf-8"?>
 <p:sld xmlns:a="http://schemas.openxmlformats.org/drawingml/2006/main" xmlns:r="http://schemas.openxmlformats.org/officeDocument/2006/relationships" xmlns:p="http://schemas.openxmlformats.org/presentationml/2006/main">
   <p:cSld>
     <p:spTree>
@@ -42369,7 +42777,7 @@
 </p:sld>
 </file>
 
-<file path=ppt/slides/slide8.xml><?xml version="1.0" encoding="utf-8"?>
+<file path=ppt/slides/slide9.xml><?xml version="1.0" encoding="utf-8"?>
 <p:sld xmlns:a="http://schemas.openxmlformats.org/drawingml/2006/main" xmlns:r="http://schemas.openxmlformats.org/officeDocument/2006/relationships" xmlns:p="http://schemas.openxmlformats.org/presentationml/2006/main">
   <p:cSld>
     <p:spTree>
@@ -42593,259 +43001,6 @@
         <p:bldAsOne/>
       </p:bldGraphic>
       <p:bldP spid="5" grpId="0"/>
-    </p:bldLst>
-  </p:timing>
-</p:sld>
-</file>
-
-<file path=ppt/slides/slide9.xml><?xml version="1.0" encoding="utf-8"?>
-<p:sld xmlns:a="http://schemas.openxmlformats.org/drawingml/2006/main" xmlns:r="http://schemas.openxmlformats.org/officeDocument/2006/relationships" xmlns:p="http://schemas.openxmlformats.org/presentationml/2006/main">
-  <p:cSld>
-    <p:spTree>
-      <p:nvGrpSpPr>
-        <p:cNvPr id="1" name=""/>
-        <p:cNvGrpSpPr/>
-        <p:nvPr/>
-      </p:nvGrpSpPr>
-      <p:grpSpPr>
-        <a:xfrm>
-          <a:off x="0" y="0"/>
-          <a:ext cx="0" cy="0"/>
-          <a:chOff x="0" y="0"/>
-          <a:chExt cx="0" cy="0"/>
-        </a:xfrm>
-      </p:grpSpPr>
-      <p:sp>
-        <p:nvSpPr>
-          <p:cNvPr id="7" name="Rectangle 6"/>
-          <p:cNvSpPr/>
-          <p:nvPr/>
-        </p:nvSpPr>
-        <p:spPr>
-          <a:xfrm>
-            <a:off x="1219200" y="754036"/>
-            <a:ext cx="3615926" cy="430887"/>
-          </a:xfrm>
-          <a:prstGeom prst="rect">
-            <a:avLst/>
-          </a:prstGeom>
-        </p:spPr>
-        <p:txBody>
-          <a:bodyPr wrap="none">
-            <a:spAutoFit/>
-          </a:bodyPr>
-          <a:lstStyle/>
-          <a:p>
-            <a:r>
-              <a:rPr lang="en-US" sz="2200" dirty="0"/>
-              <a:t>2.1 </a:t>
-            </a:r>
-            <a:r>
-              <a:rPr lang="en-US" sz="2200" dirty="0" err="1"/>
-              <a:t>Sơ</a:t>
-            </a:r>
-            <a:r>
-              <a:rPr lang="en-US" sz="2200" dirty="0"/>
-              <a:t> </a:t>
-            </a:r>
-            <a:r>
-              <a:rPr lang="en-US" sz="2200" dirty="0" err="1"/>
-              <a:t>đồ</a:t>
-            </a:r>
-            <a:r>
-              <a:rPr lang="en-US" sz="2200" dirty="0"/>
-              <a:t> </a:t>
-            </a:r>
-            <a:r>
-              <a:rPr lang="en-US" sz="2200" dirty="0" err="1"/>
-              <a:t>phân</a:t>
-            </a:r>
-            <a:r>
-              <a:rPr lang="en-US" sz="2200" dirty="0"/>
-              <a:t> </a:t>
-            </a:r>
-            <a:r>
-              <a:rPr lang="en-US" sz="2200" dirty="0" err="1"/>
-              <a:t>cấp</a:t>
-            </a:r>
-            <a:r>
-              <a:rPr lang="en-US" sz="2200" dirty="0"/>
-              <a:t> </a:t>
-            </a:r>
-            <a:r>
-              <a:rPr lang="en-US" sz="2200" dirty="0" err="1"/>
-              <a:t>chức</a:t>
-            </a:r>
-            <a:r>
-              <a:rPr lang="en-US" sz="2200" dirty="0"/>
-              <a:t> </a:t>
-            </a:r>
-            <a:r>
-              <a:rPr lang="en-US" sz="2200" dirty="0" err="1"/>
-              <a:t>năng</a:t>
-            </a:r>
-            <a:endParaRPr lang="en-US" sz="2200" dirty="0"/>
-          </a:p>
-        </p:txBody>
-      </p:sp>
-      <p:sp>
-        <p:nvSpPr>
-          <p:cNvPr id="8" name="Rectangle 7"/>
-          <p:cNvSpPr/>
-          <p:nvPr/>
-        </p:nvSpPr>
-        <p:spPr>
-          <a:xfrm>
-            <a:off x="1114942" y="284394"/>
-            <a:ext cx="7391400" cy="461665"/>
-          </a:xfrm>
-          <a:prstGeom prst="rect">
-            <a:avLst/>
-          </a:prstGeom>
-        </p:spPr>
-        <p:txBody>
-          <a:bodyPr wrap="square">
-            <a:spAutoFit/>
-          </a:bodyPr>
-          <a:lstStyle/>
-          <a:p>
-            <a:r>
-              <a:rPr lang="vi-VN" sz="2400" b="1" dirty="0"/>
-              <a:t>2.</a:t>
-            </a:r>
-            <a:r>
-              <a:rPr lang="en-US" sz="2400" b="1" dirty="0"/>
-              <a:t> </a:t>
-            </a:r>
-            <a:r>
-              <a:rPr lang="vi-VN" sz="2400" b="1" dirty="0"/>
-              <a:t>Phân tích quy trình và chức năng</a:t>
-            </a:r>
-            <a:r>
-              <a:rPr lang="en-US" sz="2400" b="1" dirty="0"/>
-              <a:t>.</a:t>
-            </a:r>
-          </a:p>
-        </p:txBody>
-      </p:sp>
-      <p:graphicFrame>
-        <p:nvGraphicFramePr>
-          <p:cNvPr id="9" name="Diagram 8"/>
-          <p:cNvGraphicFramePr/>
-          <p:nvPr>
-            <p:extLst>
-              <p:ext uri="{D42A27DB-BD31-4B8C-83A1-F6EECF244321}">
-                <p14:modId xmlns:p14="http://schemas.microsoft.com/office/powerpoint/2010/main" val="623983571"/>
-              </p:ext>
-            </p:extLst>
-          </p:nvPr>
-        </p:nvGraphicFramePr>
-        <p:xfrm>
-          <a:off x="533400" y="654947"/>
-          <a:ext cx="8077200" cy="4441804"/>
-        </p:xfrm>
-        <a:graphic>
-          <a:graphicData uri="http://schemas.openxmlformats.org/drawingml/2006/diagram">
-            <dgm:relIds xmlns:dgm="http://schemas.openxmlformats.org/drawingml/2006/diagram" xmlns:r="http://schemas.openxmlformats.org/officeDocument/2006/relationships" r:dm="rId2" r:lo="rId3" r:qs="rId4" r:cs="rId5"/>
-          </a:graphicData>
-        </a:graphic>
-      </p:graphicFrame>
-    </p:spTree>
-    <p:extLst>
-      <p:ext uri="{BB962C8B-B14F-4D97-AF65-F5344CB8AC3E}">
-        <p14:creationId xmlns:p14="http://schemas.microsoft.com/office/powerpoint/2010/main" val="2663527285"/>
-      </p:ext>
-    </p:extLst>
-  </p:cSld>
-  <p:clrMapOvr>
-    <a:masterClrMapping/>
-  </p:clrMapOvr>
-  <p:timing>
-    <p:tnLst>
-      <p:par>
-        <p:cTn id="1" dur="indefinite" restart="never" nodeType="tmRoot">
-          <p:childTnLst>
-            <p:seq concurrent="1" nextAc="seek">
-              <p:cTn id="2" dur="indefinite" nodeType="mainSeq">
-                <p:childTnLst>
-                  <p:par>
-                    <p:cTn id="3" fill="hold">
-                      <p:stCondLst>
-                        <p:cond delay="indefinite"/>
-                      </p:stCondLst>
-                      <p:childTnLst>
-                        <p:par>
-                          <p:cTn id="4" fill="hold">
-                            <p:stCondLst>
-                              <p:cond delay="0"/>
-                            </p:stCondLst>
-                            <p:childTnLst>
-                              <p:par>
-                                <p:cTn id="5" presetID="22" presetClass="entr" presetSubtype="1" fill="hold" grpId="0" nodeType="clickEffect">
-                                  <p:stCondLst>
-                                    <p:cond delay="0"/>
-                                  </p:stCondLst>
-                                  <p:childTnLst>
-                                    <p:set>
-                                      <p:cBhvr>
-                                        <p:cTn id="6" dur="1" fill="hold">
-                                          <p:stCondLst>
-                                            <p:cond delay="0"/>
-                                          </p:stCondLst>
-                                        </p:cTn>
-                                        <p:tgtEl>
-                                          <p:spTgt spid="9"/>
-                                        </p:tgtEl>
-                                        <p:attrNameLst>
-                                          <p:attrName>style.visibility</p:attrName>
-                                        </p:attrNameLst>
-                                      </p:cBhvr>
-                                      <p:to>
-                                        <p:strVal val="visible"/>
-                                      </p:to>
-                                    </p:set>
-                                    <p:animEffect transition="in" filter="wipe(up)">
-                                      <p:cBhvr>
-                                        <p:cTn id="7" dur="500"/>
-                                        <p:tgtEl>
-                                          <p:spTgt spid="9"/>
-                                        </p:tgtEl>
-                                      </p:cBhvr>
-                                    </p:animEffect>
-                                  </p:childTnLst>
-                                </p:cTn>
-                              </p:par>
-                            </p:childTnLst>
-                          </p:cTn>
-                        </p:par>
-                      </p:childTnLst>
-                    </p:cTn>
-                  </p:par>
-                </p:childTnLst>
-              </p:cTn>
-              <p:prevCondLst>
-                <p:cond evt="onPrev" delay="0">
-                  <p:tgtEl>
-                    <p:sldTgt/>
-                  </p:tgtEl>
-                </p:cond>
-              </p:prevCondLst>
-              <p:nextCondLst>
-                <p:cond evt="onNext" delay="0">
-                  <p:tgtEl>
-                    <p:sldTgt/>
-                  </p:tgtEl>
-                </p:cond>
-              </p:nextCondLst>
-            </p:seq>
-          </p:childTnLst>
-        </p:cTn>
-      </p:par>
-    </p:tnLst>
-    <p:bldLst>
-      <p:bldGraphic spid="9" grpId="0">
-        <p:bldAsOne/>
-      </p:bldGraphic>
     </p:bldLst>
   </p:timing>
 </p:sld>

</xml_diff>